<commit_message>
update day4 & readme
</commit_message>
<xml_diff>
--- a/Day_4/Day_4.pptx
+++ b/Day_4/Day_4.pptx
@@ -31,6 +31,9 @@
     <p:sldId id="276" r:id="rId25"/>
     <p:sldId id="277" r:id="rId26"/>
     <p:sldId id="278" r:id="rId27"/>
+    <p:sldId id="282" r:id="rId28"/>
+    <p:sldId id="283" r:id="rId29"/>
+    <p:sldId id="284" r:id="rId30"/>
   </p:sldIdLst>
   <p:sldSz cx="12192000" cy="6858000"/>
   <p:notesSz cx="6858000" cy="9144000"/>
@@ -15826,7 +15829,7 @@
             <a:pPr lvl="1"/>
             <a:r>
               <a:rPr lang="en-US" dirty="0"/>
-              <a:t>This is done on the command line</a:t>
+              <a:t>This is done on the command line via the shell</a:t>
             </a:r>
           </a:p>
           <a:p>
@@ -22283,6 +22286,348 @@
   <p:clrMapOvr>
     <a:masterClrMapping/>
   </p:clrMapOvr>
+  <p:timing>
+    <p:tnLst>
+      <p:par>
+        <p:cTn id="1" dur="indefinite" restart="never" nodeType="tmRoot">
+          <p:childTnLst>
+            <p:seq concurrent="1" nextAc="seek">
+              <p:cTn id="2" dur="indefinite" nodeType="mainSeq">
+                <p:childTnLst>
+                  <p:par>
+                    <p:cTn id="3" fill="hold">
+                      <p:stCondLst>
+                        <p:cond delay="indefinite"/>
+                      </p:stCondLst>
+                      <p:childTnLst>
+                        <p:par>
+                          <p:cTn id="4" fill="hold">
+                            <p:stCondLst>
+                              <p:cond delay="0"/>
+                            </p:stCondLst>
+                            <p:childTnLst>
+                              <p:par>
+                                <p:cTn id="5" presetID="2" presetClass="entr" presetSubtype="4" fill="hold" grpId="0" nodeType="clickEffect">
+                                  <p:stCondLst>
+                                    <p:cond delay="0"/>
+                                  </p:stCondLst>
+                                  <p:childTnLst>
+                                    <p:set>
+                                      <p:cBhvr>
+                                        <p:cTn id="6" dur="1" fill="hold">
+                                          <p:stCondLst>
+                                            <p:cond delay="0"/>
+                                          </p:stCondLst>
+                                        </p:cTn>
+                                        <p:tgtEl>
+                                          <p:spTgt spid="3">
+                                            <p:txEl>
+                                              <p:pRg st="0" end="0"/>
+                                            </p:txEl>
+                                          </p:spTgt>
+                                        </p:tgtEl>
+                                        <p:attrNameLst>
+                                          <p:attrName>style.visibility</p:attrName>
+                                        </p:attrNameLst>
+                                      </p:cBhvr>
+                                      <p:to>
+                                        <p:strVal val="visible"/>
+                                      </p:to>
+                                    </p:set>
+                                    <p:anim calcmode="lin" valueType="num">
+                                      <p:cBhvr additive="base">
+                                        <p:cTn id="7" dur="500" fill="hold"/>
+                                        <p:tgtEl>
+                                          <p:spTgt spid="3">
+                                            <p:txEl>
+                                              <p:pRg st="0" end="0"/>
+                                            </p:txEl>
+                                          </p:spTgt>
+                                        </p:tgtEl>
+                                        <p:attrNameLst>
+                                          <p:attrName>ppt_x</p:attrName>
+                                        </p:attrNameLst>
+                                      </p:cBhvr>
+                                      <p:tavLst>
+                                        <p:tav tm="0">
+                                          <p:val>
+                                            <p:strVal val="#ppt_x"/>
+                                          </p:val>
+                                        </p:tav>
+                                        <p:tav tm="100000">
+                                          <p:val>
+                                            <p:strVal val="#ppt_x"/>
+                                          </p:val>
+                                        </p:tav>
+                                      </p:tavLst>
+                                    </p:anim>
+                                    <p:anim calcmode="lin" valueType="num">
+                                      <p:cBhvr additive="base">
+                                        <p:cTn id="8" dur="500" fill="hold"/>
+                                        <p:tgtEl>
+                                          <p:spTgt spid="3">
+                                            <p:txEl>
+                                              <p:pRg st="0" end="0"/>
+                                            </p:txEl>
+                                          </p:spTgt>
+                                        </p:tgtEl>
+                                        <p:attrNameLst>
+                                          <p:attrName>ppt_y</p:attrName>
+                                        </p:attrNameLst>
+                                      </p:cBhvr>
+                                      <p:tavLst>
+                                        <p:tav tm="0">
+                                          <p:val>
+                                            <p:strVal val="1+#ppt_h/2"/>
+                                          </p:val>
+                                        </p:tav>
+                                        <p:tav tm="100000">
+                                          <p:val>
+                                            <p:strVal val="#ppt_y"/>
+                                          </p:val>
+                                        </p:tav>
+                                      </p:tavLst>
+                                    </p:anim>
+                                  </p:childTnLst>
+                                </p:cTn>
+                              </p:par>
+                            </p:childTnLst>
+                          </p:cTn>
+                        </p:par>
+                      </p:childTnLst>
+                    </p:cTn>
+                  </p:par>
+                  <p:par>
+                    <p:cTn id="9" fill="hold">
+                      <p:stCondLst>
+                        <p:cond delay="indefinite"/>
+                      </p:stCondLst>
+                      <p:childTnLst>
+                        <p:par>
+                          <p:cTn id="10" fill="hold">
+                            <p:stCondLst>
+                              <p:cond delay="0"/>
+                            </p:stCondLst>
+                            <p:childTnLst>
+                              <p:par>
+                                <p:cTn id="11" presetID="2" presetClass="entr" presetSubtype="4" fill="hold" grpId="0" nodeType="clickEffect">
+                                  <p:stCondLst>
+                                    <p:cond delay="0"/>
+                                  </p:stCondLst>
+                                  <p:childTnLst>
+                                    <p:set>
+                                      <p:cBhvr>
+                                        <p:cTn id="12" dur="1" fill="hold">
+                                          <p:stCondLst>
+                                            <p:cond delay="0"/>
+                                          </p:stCondLst>
+                                        </p:cTn>
+                                        <p:tgtEl>
+                                          <p:spTgt spid="3">
+                                            <p:txEl>
+                                              <p:pRg st="2" end="2"/>
+                                            </p:txEl>
+                                          </p:spTgt>
+                                        </p:tgtEl>
+                                        <p:attrNameLst>
+                                          <p:attrName>style.visibility</p:attrName>
+                                        </p:attrNameLst>
+                                      </p:cBhvr>
+                                      <p:to>
+                                        <p:strVal val="visible"/>
+                                      </p:to>
+                                    </p:set>
+                                    <p:anim calcmode="lin" valueType="num">
+                                      <p:cBhvr additive="base">
+                                        <p:cTn id="13" dur="500" fill="hold"/>
+                                        <p:tgtEl>
+                                          <p:spTgt spid="3">
+                                            <p:txEl>
+                                              <p:pRg st="2" end="2"/>
+                                            </p:txEl>
+                                          </p:spTgt>
+                                        </p:tgtEl>
+                                        <p:attrNameLst>
+                                          <p:attrName>ppt_x</p:attrName>
+                                        </p:attrNameLst>
+                                      </p:cBhvr>
+                                      <p:tavLst>
+                                        <p:tav tm="0">
+                                          <p:val>
+                                            <p:strVal val="#ppt_x"/>
+                                          </p:val>
+                                        </p:tav>
+                                        <p:tav tm="100000">
+                                          <p:val>
+                                            <p:strVal val="#ppt_x"/>
+                                          </p:val>
+                                        </p:tav>
+                                      </p:tavLst>
+                                    </p:anim>
+                                    <p:anim calcmode="lin" valueType="num">
+                                      <p:cBhvr additive="base">
+                                        <p:cTn id="14" dur="500" fill="hold"/>
+                                        <p:tgtEl>
+                                          <p:spTgt spid="3">
+                                            <p:txEl>
+                                              <p:pRg st="2" end="2"/>
+                                            </p:txEl>
+                                          </p:spTgt>
+                                        </p:tgtEl>
+                                        <p:attrNameLst>
+                                          <p:attrName>ppt_y</p:attrName>
+                                        </p:attrNameLst>
+                                      </p:cBhvr>
+                                      <p:tavLst>
+                                        <p:tav tm="0">
+                                          <p:val>
+                                            <p:strVal val="1+#ppt_h/2"/>
+                                          </p:val>
+                                        </p:tav>
+                                        <p:tav tm="100000">
+                                          <p:val>
+                                            <p:strVal val="#ppt_y"/>
+                                          </p:val>
+                                        </p:tav>
+                                      </p:tavLst>
+                                    </p:anim>
+                                  </p:childTnLst>
+                                </p:cTn>
+                              </p:par>
+                            </p:childTnLst>
+                          </p:cTn>
+                        </p:par>
+                      </p:childTnLst>
+                    </p:cTn>
+                  </p:par>
+                  <p:par>
+                    <p:cTn id="15" fill="hold">
+                      <p:stCondLst>
+                        <p:cond delay="indefinite"/>
+                      </p:stCondLst>
+                      <p:childTnLst>
+                        <p:par>
+                          <p:cTn id="16" fill="hold">
+                            <p:stCondLst>
+                              <p:cond delay="0"/>
+                            </p:stCondLst>
+                            <p:childTnLst>
+                              <p:par>
+                                <p:cTn id="17" presetID="2" presetClass="entr" presetSubtype="4" fill="hold" grpId="0" nodeType="clickEffect">
+                                  <p:stCondLst>
+                                    <p:cond delay="0"/>
+                                  </p:stCondLst>
+                                  <p:childTnLst>
+                                    <p:set>
+                                      <p:cBhvr>
+                                        <p:cTn id="18" dur="1" fill="hold">
+                                          <p:stCondLst>
+                                            <p:cond delay="0"/>
+                                          </p:stCondLst>
+                                        </p:cTn>
+                                        <p:tgtEl>
+                                          <p:spTgt spid="3">
+                                            <p:txEl>
+                                              <p:pRg st="4" end="4"/>
+                                            </p:txEl>
+                                          </p:spTgt>
+                                        </p:tgtEl>
+                                        <p:attrNameLst>
+                                          <p:attrName>style.visibility</p:attrName>
+                                        </p:attrNameLst>
+                                      </p:cBhvr>
+                                      <p:to>
+                                        <p:strVal val="visible"/>
+                                      </p:to>
+                                    </p:set>
+                                    <p:anim calcmode="lin" valueType="num">
+                                      <p:cBhvr additive="base">
+                                        <p:cTn id="19" dur="500" fill="hold"/>
+                                        <p:tgtEl>
+                                          <p:spTgt spid="3">
+                                            <p:txEl>
+                                              <p:pRg st="4" end="4"/>
+                                            </p:txEl>
+                                          </p:spTgt>
+                                        </p:tgtEl>
+                                        <p:attrNameLst>
+                                          <p:attrName>ppt_x</p:attrName>
+                                        </p:attrNameLst>
+                                      </p:cBhvr>
+                                      <p:tavLst>
+                                        <p:tav tm="0">
+                                          <p:val>
+                                            <p:strVal val="#ppt_x"/>
+                                          </p:val>
+                                        </p:tav>
+                                        <p:tav tm="100000">
+                                          <p:val>
+                                            <p:strVal val="#ppt_x"/>
+                                          </p:val>
+                                        </p:tav>
+                                      </p:tavLst>
+                                    </p:anim>
+                                    <p:anim calcmode="lin" valueType="num">
+                                      <p:cBhvr additive="base">
+                                        <p:cTn id="20" dur="500" fill="hold"/>
+                                        <p:tgtEl>
+                                          <p:spTgt spid="3">
+                                            <p:txEl>
+                                              <p:pRg st="4" end="4"/>
+                                            </p:txEl>
+                                          </p:spTgt>
+                                        </p:tgtEl>
+                                        <p:attrNameLst>
+                                          <p:attrName>ppt_y</p:attrName>
+                                        </p:attrNameLst>
+                                      </p:cBhvr>
+                                      <p:tavLst>
+                                        <p:tav tm="0">
+                                          <p:val>
+                                            <p:strVal val="1+#ppt_h/2"/>
+                                          </p:val>
+                                        </p:tav>
+                                        <p:tav tm="100000">
+                                          <p:val>
+                                            <p:strVal val="#ppt_y"/>
+                                          </p:val>
+                                        </p:tav>
+                                      </p:tavLst>
+                                    </p:anim>
+                                  </p:childTnLst>
+                                </p:cTn>
+                              </p:par>
+                            </p:childTnLst>
+                          </p:cTn>
+                        </p:par>
+                      </p:childTnLst>
+                    </p:cTn>
+                  </p:par>
+                </p:childTnLst>
+              </p:cTn>
+              <p:prevCondLst>
+                <p:cond evt="onPrev" delay="0">
+                  <p:tgtEl>
+                    <p:sldTgt/>
+                  </p:tgtEl>
+                </p:cond>
+              </p:prevCondLst>
+              <p:nextCondLst>
+                <p:cond evt="onNext" delay="0">
+                  <p:tgtEl>
+                    <p:sldTgt/>
+                  </p:tgtEl>
+                </p:cond>
+              </p:nextCondLst>
+            </p:seq>
+          </p:childTnLst>
+        </p:cTn>
+      </p:par>
+    </p:tnLst>
+    <p:bldLst>
+      <p:bldP spid="3" grpId="0" build="p"/>
+    </p:bldLst>
+  </p:timing>
 </p:sld>
 </file>
 
@@ -24012,7 +24357,12 @@
             <p:ph idx="1"/>
           </p:nvPr>
         </p:nvSpPr>
-        <p:spPr/>
+        <p:spPr>
+          <a:xfrm>
+            <a:off x="1141412" y="2249487"/>
+            <a:ext cx="9905999" cy="2840673"/>
+          </a:xfrm>
+        </p:spPr>
         <p:txBody>
           <a:bodyPr/>
           <a:lstStyle/>
@@ -24052,12 +24402,132 @@
               <a:t>What do you think the function definition for </a:t>
             </a:r>
             <a:r>
-              <a:rPr lang="en-US" dirty="0" err="1"/>
+              <a:rPr lang="en-US" dirty="0" err="1">
+                <a:solidFill>
+                  <a:schemeClr val="accent6"/>
+                </a:solidFill>
+                <a:latin typeface="Consolas" panose="020B0609020204030204" pitchFamily="49" charset="0"/>
+                <a:cs typeface="Consolas" panose="020B0609020204030204" pitchFamily="49" charset="0"/>
+              </a:rPr>
               <a:t>isalpha</a:t>
             </a:r>
             <a:r>
+              <a:rPr lang="en-US" dirty="0">
+                <a:latin typeface="Consolas" panose="020B0609020204030204" pitchFamily="49" charset="0"/>
+                <a:cs typeface="Consolas" panose="020B0609020204030204" pitchFamily="49" charset="0"/>
+              </a:rPr>
+              <a:t>()</a:t>
+            </a:r>
+            <a:r>
               <a:rPr lang="en-US" dirty="0"/>
-              <a:t>() looks like?</a:t>
+              <a:t> looks like?</a:t>
+            </a:r>
+          </a:p>
+          <a:p>
+            <a:pPr lvl="1"/>
+            <a:r>
+              <a:rPr lang="en-US" dirty="0"/>
+              <a:t>I don’t expect that you actually know this detail</a:t>
+            </a:r>
+          </a:p>
+        </p:txBody>
+      </p:sp>
+      <p:pic>
+        <p:nvPicPr>
+          <p:cNvPr id="5" name="Picture 4">
+            <a:extLst>
+              <a:ext uri="{FF2B5EF4-FFF2-40B4-BE49-F238E27FC236}">
+                <a16:creationId xmlns:a16="http://schemas.microsoft.com/office/drawing/2014/main" id="{91AE461F-ACB4-224C-9416-FABF03D81E21}"/>
+              </a:ext>
+            </a:extLst>
+          </p:cNvPr>
+          <p:cNvPicPr>
+            <a:picLocks noChangeAspect="1"/>
+          </p:cNvPicPr>
+          <p:nvPr/>
+        </p:nvPicPr>
+        <p:blipFill>
+          <a:blip r:embed="rId2"/>
+          <a:stretch>
+            <a:fillRect/>
+          </a:stretch>
+        </p:blipFill>
+        <p:spPr>
+          <a:xfrm>
+            <a:off x="1330960" y="5234096"/>
+            <a:ext cx="4566920" cy="1419007"/>
+          </a:xfrm>
+          <a:prstGeom prst="rect">
+            <a:avLst/>
+          </a:prstGeom>
+        </p:spPr>
+      </p:pic>
+      <p:sp>
+        <p:nvSpPr>
+          <p:cNvPr id="6" name="TextBox 5">
+            <a:extLst>
+              <a:ext uri="{FF2B5EF4-FFF2-40B4-BE49-F238E27FC236}">
+                <a16:creationId xmlns:a16="http://schemas.microsoft.com/office/drawing/2014/main" id="{B9B4D33E-2B88-D54C-A8FA-C6C2CE9AD514}"/>
+              </a:ext>
+            </a:extLst>
+          </p:cNvPr>
+          <p:cNvSpPr txBox="1"/>
+          <p:nvPr/>
+        </p:nvSpPr>
+        <p:spPr>
+          <a:xfrm>
+            <a:off x="5897880" y="5242559"/>
+            <a:ext cx="5434501" cy="369332"/>
+          </a:xfrm>
+          <a:prstGeom prst="rect">
+            <a:avLst/>
+          </a:prstGeom>
+          <a:noFill/>
+        </p:spPr>
+        <p:txBody>
+          <a:bodyPr wrap="none" rtlCol="0">
+            <a:spAutoFit/>
+          </a:bodyPr>
+          <a:lstStyle/>
+          <a:p>
+            <a:r>
+              <a:rPr lang="en-US" dirty="0"/>
+              <a:t>Fear not, this is just a fun little extra piece of information </a:t>
+            </a:r>
+          </a:p>
+        </p:txBody>
+      </p:sp>
+      <p:sp>
+        <p:nvSpPr>
+          <p:cNvPr id="7" name="TextBox 6">
+            <a:extLst>
+              <a:ext uri="{FF2B5EF4-FFF2-40B4-BE49-F238E27FC236}">
+                <a16:creationId xmlns:a16="http://schemas.microsoft.com/office/drawing/2014/main" id="{8A3F5BE4-31A6-7344-BC6F-AF45E78E925E}"/>
+              </a:ext>
+            </a:extLst>
+          </p:cNvPr>
+          <p:cNvSpPr txBox="1"/>
+          <p:nvPr/>
+        </p:nvSpPr>
+        <p:spPr>
+          <a:xfrm>
+            <a:off x="5897880" y="5755827"/>
+            <a:ext cx="5864503" cy="646331"/>
+          </a:xfrm>
+          <a:prstGeom prst="rect">
+            <a:avLst/>
+          </a:prstGeom>
+          <a:noFill/>
+        </p:spPr>
+        <p:txBody>
+          <a:bodyPr wrap="square" rtlCol="0">
+            <a:spAutoFit/>
+          </a:bodyPr>
+          <a:lstStyle/>
+          <a:p>
+            <a:r>
+              <a:rPr lang="en-US" dirty="0"/>
+              <a:t>If you value your sanity and don’t want to go crazy then please DON’T MEMORIZE STANDARD LIBRARY FUNCTIONS</a:t>
             </a:r>
           </a:p>
         </p:txBody>
@@ -24072,6 +24542,3307 @@
   <p:clrMapOvr>
     <a:masterClrMapping/>
   </p:clrMapOvr>
+  <p:timing>
+    <p:tnLst>
+      <p:par>
+        <p:cTn id="1" dur="indefinite" restart="never" nodeType="tmRoot">
+          <p:childTnLst>
+            <p:seq concurrent="1" nextAc="seek">
+              <p:cTn id="2" dur="indefinite" nodeType="mainSeq">
+                <p:childTnLst>
+                  <p:par>
+                    <p:cTn id="3" fill="hold">
+                      <p:stCondLst>
+                        <p:cond delay="indefinite"/>
+                      </p:stCondLst>
+                      <p:childTnLst>
+                        <p:par>
+                          <p:cTn id="4" fill="hold">
+                            <p:stCondLst>
+                              <p:cond delay="0"/>
+                            </p:stCondLst>
+                            <p:childTnLst>
+                              <p:par>
+                                <p:cTn id="5" presetID="2" presetClass="entr" presetSubtype="4" fill="hold" grpId="0" nodeType="clickEffect">
+                                  <p:stCondLst>
+                                    <p:cond delay="0"/>
+                                  </p:stCondLst>
+                                  <p:childTnLst>
+                                    <p:set>
+                                      <p:cBhvr>
+                                        <p:cTn id="6" dur="1" fill="hold">
+                                          <p:stCondLst>
+                                            <p:cond delay="0"/>
+                                          </p:stCondLst>
+                                        </p:cTn>
+                                        <p:tgtEl>
+                                          <p:spTgt spid="3">
+                                            <p:txEl>
+                                              <p:pRg st="0" end="0"/>
+                                            </p:txEl>
+                                          </p:spTgt>
+                                        </p:tgtEl>
+                                        <p:attrNameLst>
+                                          <p:attrName>style.visibility</p:attrName>
+                                        </p:attrNameLst>
+                                      </p:cBhvr>
+                                      <p:to>
+                                        <p:strVal val="visible"/>
+                                      </p:to>
+                                    </p:set>
+                                    <p:anim calcmode="lin" valueType="num">
+                                      <p:cBhvr additive="base">
+                                        <p:cTn id="7" dur="500" fill="hold"/>
+                                        <p:tgtEl>
+                                          <p:spTgt spid="3">
+                                            <p:txEl>
+                                              <p:pRg st="0" end="0"/>
+                                            </p:txEl>
+                                          </p:spTgt>
+                                        </p:tgtEl>
+                                        <p:attrNameLst>
+                                          <p:attrName>ppt_x</p:attrName>
+                                        </p:attrNameLst>
+                                      </p:cBhvr>
+                                      <p:tavLst>
+                                        <p:tav tm="0">
+                                          <p:val>
+                                            <p:strVal val="#ppt_x"/>
+                                          </p:val>
+                                        </p:tav>
+                                        <p:tav tm="100000">
+                                          <p:val>
+                                            <p:strVal val="#ppt_x"/>
+                                          </p:val>
+                                        </p:tav>
+                                      </p:tavLst>
+                                    </p:anim>
+                                    <p:anim calcmode="lin" valueType="num">
+                                      <p:cBhvr additive="base">
+                                        <p:cTn id="8" dur="500" fill="hold"/>
+                                        <p:tgtEl>
+                                          <p:spTgt spid="3">
+                                            <p:txEl>
+                                              <p:pRg st="0" end="0"/>
+                                            </p:txEl>
+                                          </p:spTgt>
+                                        </p:tgtEl>
+                                        <p:attrNameLst>
+                                          <p:attrName>ppt_y</p:attrName>
+                                        </p:attrNameLst>
+                                      </p:cBhvr>
+                                      <p:tavLst>
+                                        <p:tav tm="0">
+                                          <p:val>
+                                            <p:strVal val="1+#ppt_h/2"/>
+                                          </p:val>
+                                        </p:tav>
+                                        <p:tav tm="100000">
+                                          <p:val>
+                                            <p:strVal val="#ppt_y"/>
+                                          </p:val>
+                                        </p:tav>
+                                      </p:tavLst>
+                                    </p:anim>
+                                  </p:childTnLst>
+                                </p:cTn>
+                              </p:par>
+                            </p:childTnLst>
+                          </p:cTn>
+                        </p:par>
+                      </p:childTnLst>
+                    </p:cTn>
+                  </p:par>
+                  <p:par>
+                    <p:cTn id="9" fill="hold">
+                      <p:stCondLst>
+                        <p:cond delay="indefinite"/>
+                      </p:stCondLst>
+                      <p:childTnLst>
+                        <p:par>
+                          <p:cTn id="10" fill="hold">
+                            <p:stCondLst>
+                              <p:cond delay="0"/>
+                            </p:stCondLst>
+                            <p:childTnLst>
+                              <p:par>
+                                <p:cTn id="11" presetID="2" presetClass="entr" presetSubtype="4" fill="hold" grpId="0" nodeType="clickEffect">
+                                  <p:stCondLst>
+                                    <p:cond delay="0"/>
+                                  </p:stCondLst>
+                                  <p:childTnLst>
+                                    <p:set>
+                                      <p:cBhvr>
+                                        <p:cTn id="12" dur="1" fill="hold">
+                                          <p:stCondLst>
+                                            <p:cond delay="0"/>
+                                          </p:stCondLst>
+                                        </p:cTn>
+                                        <p:tgtEl>
+                                          <p:spTgt spid="3">
+                                            <p:txEl>
+                                              <p:pRg st="2" end="2"/>
+                                            </p:txEl>
+                                          </p:spTgt>
+                                        </p:tgtEl>
+                                        <p:attrNameLst>
+                                          <p:attrName>style.visibility</p:attrName>
+                                        </p:attrNameLst>
+                                      </p:cBhvr>
+                                      <p:to>
+                                        <p:strVal val="visible"/>
+                                      </p:to>
+                                    </p:set>
+                                    <p:anim calcmode="lin" valueType="num">
+                                      <p:cBhvr additive="base">
+                                        <p:cTn id="13" dur="500" fill="hold"/>
+                                        <p:tgtEl>
+                                          <p:spTgt spid="3">
+                                            <p:txEl>
+                                              <p:pRg st="2" end="2"/>
+                                            </p:txEl>
+                                          </p:spTgt>
+                                        </p:tgtEl>
+                                        <p:attrNameLst>
+                                          <p:attrName>ppt_x</p:attrName>
+                                        </p:attrNameLst>
+                                      </p:cBhvr>
+                                      <p:tavLst>
+                                        <p:tav tm="0">
+                                          <p:val>
+                                            <p:strVal val="#ppt_x"/>
+                                          </p:val>
+                                        </p:tav>
+                                        <p:tav tm="100000">
+                                          <p:val>
+                                            <p:strVal val="#ppt_x"/>
+                                          </p:val>
+                                        </p:tav>
+                                      </p:tavLst>
+                                    </p:anim>
+                                    <p:anim calcmode="lin" valueType="num">
+                                      <p:cBhvr additive="base">
+                                        <p:cTn id="14" dur="500" fill="hold"/>
+                                        <p:tgtEl>
+                                          <p:spTgt spid="3">
+                                            <p:txEl>
+                                              <p:pRg st="2" end="2"/>
+                                            </p:txEl>
+                                          </p:spTgt>
+                                        </p:tgtEl>
+                                        <p:attrNameLst>
+                                          <p:attrName>ppt_y</p:attrName>
+                                        </p:attrNameLst>
+                                      </p:cBhvr>
+                                      <p:tavLst>
+                                        <p:tav tm="0">
+                                          <p:val>
+                                            <p:strVal val="1+#ppt_h/2"/>
+                                          </p:val>
+                                        </p:tav>
+                                        <p:tav tm="100000">
+                                          <p:val>
+                                            <p:strVal val="#ppt_y"/>
+                                          </p:val>
+                                        </p:tav>
+                                      </p:tavLst>
+                                    </p:anim>
+                                  </p:childTnLst>
+                                </p:cTn>
+                              </p:par>
+                              <p:par>
+                                <p:cTn id="15" presetID="2" presetClass="entr" presetSubtype="4" fill="hold" grpId="0" nodeType="withEffect">
+                                  <p:stCondLst>
+                                    <p:cond delay="0"/>
+                                  </p:stCondLst>
+                                  <p:childTnLst>
+                                    <p:set>
+                                      <p:cBhvr>
+                                        <p:cTn id="16" dur="1" fill="hold">
+                                          <p:stCondLst>
+                                            <p:cond delay="0"/>
+                                          </p:stCondLst>
+                                        </p:cTn>
+                                        <p:tgtEl>
+                                          <p:spTgt spid="3">
+                                            <p:txEl>
+                                              <p:pRg st="3" end="3"/>
+                                            </p:txEl>
+                                          </p:spTgt>
+                                        </p:tgtEl>
+                                        <p:attrNameLst>
+                                          <p:attrName>style.visibility</p:attrName>
+                                        </p:attrNameLst>
+                                      </p:cBhvr>
+                                      <p:to>
+                                        <p:strVal val="visible"/>
+                                      </p:to>
+                                    </p:set>
+                                    <p:anim calcmode="lin" valueType="num">
+                                      <p:cBhvr additive="base">
+                                        <p:cTn id="17" dur="500" fill="hold"/>
+                                        <p:tgtEl>
+                                          <p:spTgt spid="3">
+                                            <p:txEl>
+                                              <p:pRg st="3" end="3"/>
+                                            </p:txEl>
+                                          </p:spTgt>
+                                        </p:tgtEl>
+                                        <p:attrNameLst>
+                                          <p:attrName>ppt_x</p:attrName>
+                                        </p:attrNameLst>
+                                      </p:cBhvr>
+                                      <p:tavLst>
+                                        <p:tav tm="0">
+                                          <p:val>
+                                            <p:strVal val="#ppt_x"/>
+                                          </p:val>
+                                        </p:tav>
+                                        <p:tav tm="100000">
+                                          <p:val>
+                                            <p:strVal val="#ppt_x"/>
+                                          </p:val>
+                                        </p:tav>
+                                      </p:tavLst>
+                                    </p:anim>
+                                    <p:anim calcmode="lin" valueType="num">
+                                      <p:cBhvr additive="base">
+                                        <p:cTn id="18" dur="500" fill="hold"/>
+                                        <p:tgtEl>
+                                          <p:spTgt spid="3">
+                                            <p:txEl>
+                                              <p:pRg st="3" end="3"/>
+                                            </p:txEl>
+                                          </p:spTgt>
+                                        </p:tgtEl>
+                                        <p:attrNameLst>
+                                          <p:attrName>ppt_y</p:attrName>
+                                        </p:attrNameLst>
+                                      </p:cBhvr>
+                                      <p:tavLst>
+                                        <p:tav tm="0">
+                                          <p:val>
+                                            <p:strVal val="1+#ppt_h/2"/>
+                                          </p:val>
+                                        </p:tav>
+                                        <p:tav tm="100000">
+                                          <p:val>
+                                            <p:strVal val="#ppt_y"/>
+                                          </p:val>
+                                        </p:tav>
+                                      </p:tavLst>
+                                    </p:anim>
+                                  </p:childTnLst>
+                                </p:cTn>
+                              </p:par>
+                            </p:childTnLst>
+                          </p:cTn>
+                        </p:par>
+                      </p:childTnLst>
+                    </p:cTn>
+                  </p:par>
+                  <p:par>
+                    <p:cTn id="19" fill="hold">
+                      <p:stCondLst>
+                        <p:cond delay="indefinite"/>
+                      </p:stCondLst>
+                      <p:childTnLst>
+                        <p:par>
+                          <p:cTn id="20" fill="hold">
+                            <p:stCondLst>
+                              <p:cond delay="0"/>
+                            </p:stCondLst>
+                            <p:childTnLst>
+                              <p:par>
+                                <p:cTn id="21" presetID="2" presetClass="entr" presetSubtype="4" fill="hold" nodeType="clickEffect">
+                                  <p:stCondLst>
+                                    <p:cond delay="0"/>
+                                  </p:stCondLst>
+                                  <p:childTnLst>
+                                    <p:set>
+                                      <p:cBhvr>
+                                        <p:cTn id="22" dur="1" fill="hold">
+                                          <p:stCondLst>
+                                            <p:cond delay="0"/>
+                                          </p:stCondLst>
+                                        </p:cTn>
+                                        <p:tgtEl>
+                                          <p:spTgt spid="5"/>
+                                        </p:tgtEl>
+                                        <p:attrNameLst>
+                                          <p:attrName>style.visibility</p:attrName>
+                                        </p:attrNameLst>
+                                      </p:cBhvr>
+                                      <p:to>
+                                        <p:strVal val="visible"/>
+                                      </p:to>
+                                    </p:set>
+                                    <p:anim calcmode="lin" valueType="num">
+                                      <p:cBhvr additive="base">
+                                        <p:cTn id="23" dur="500" fill="hold"/>
+                                        <p:tgtEl>
+                                          <p:spTgt spid="5"/>
+                                        </p:tgtEl>
+                                        <p:attrNameLst>
+                                          <p:attrName>ppt_x</p:attrName>
+                                        </p:attrNameLst>
+                                      </p:cBhvr>
+                                      <p:tavLst>
+                                        <p:tav tm="0">
+                                          <p:val>
+                                            <p:strVal val="#ppt_x"/>
+                                          </p:val>
+                                        </p:tav>
+                                        <p:tav tm="100000">
+                                          <p:val>
+                                            <p:strVal val="#ppt_x"/>
+                                          </p:val>
+                                        </p:tav>
+                                      </p:tavLst>
+                                    </p:anim>
+                                    <p:anim calcmode="lin" valueType="num">
+                                      <p:cBhvr additive="base">
+                                        <p:cTn id="24" dur="500" fill="hold"/>
+                                        <p:tgtEl>
+                                          <p:spTgt spid="5"/>
+                                        </p:tgtEl>
+                                        <p:attrNameLst>
+                                          <p:attrName>ppt_y</p:attrName>
+                                        </p:attrNameLst>
+                                      </p:cBhvr>
+                                      <p:tavLst>
+                                        <p:tav tm="0">
+                                          <p:val>
+                                            <p:strVal val="1+#ppt_h/2"/>
+                                          </p:val>
+                                        </p:tav>
+                                        <p:tav tm="100000">
+                                          <p:val>
+                                            <p:strVal val="#ppt_y"/>
+                                          </p:val>
+                                        </p:tav>
+                                      </p:tavLst>
+                                    </p:anim>
+                                  </p:childTnLst>
+                                </p:cTn>
+                              </p:par>
+                            </p:childTnLst>
+                          </p:cTn>
+                        </p:par>
+                      </p:childTnLst>
+                    </p:cTn>
+                  </p:par>
+                  <p:par>
+                    <p:cTn id="25" fill="hold">
+                      <p:stCondLst>
+                        <p:cond delay="indefinite"/>
+                      </p:stCondLst>
+                      <p:childTnLst>
+                        <p:par>
+                          <p:cTn id="26" fill="hold">
+                            <p:stCondLst>
+                              <p:cond delay="0"/>
+                            </p:stCondLst>
+                            <p:childTnLst>
+                              <p:par>
+                                <p:cTn id="27" presetID="10" presetClass="entr" presetSubtype="0" fill="hold" grpId="0" nodeType="clickEffect">
+                                  <p:stCondLst>
+                                    <p:cond delay="0"/>
+                                  </p:stCondLst>
+                                  <p:childTnLst>
+                                    <p:set>
+                                      <p:cBhvr>
+                                        <p:cTn id="28" dur="1" fill="hold">
+                                          <p:stCondLst>
+                                            <p:cond delay="0"/>
+                                          </p:stCondLst>
+                                        </p:cTn>
+                                        <p:tgtEl>
+                                          <p:spTgt spid="6"/>
+                                        </p:tgtEl>
+                                        <p:attrNameLst>
+                                          <p:attrName>style.visibility</p:attrName>
+                                        </p:attrNameLst>
+                                      </p:cBhvr>
+                                      <p:to>
+                                        <p:strVal val="visible"/>
+                                      </p:to>
+                                    </p:set>
+                                    <p:animEffect transition="in" filter="fade">
+                                      <p:cBhvr>
+                                        <p:cTn id="29" dur="500"/>
+                                        <p:tgtEl>
+                                          <p:spTgt spid="6"/>
+                                        </p:tgtEl>
+                                      </p:cBhvr>
+                                    </p:animEffect>
+                                  </p:childTnLst>
+                                </p:cTn>
+                              </p:par>
+                            </p:childTnLst>
+                          </p:cTn>
+                        </p:par>
+                      </p:childTnLst>
+                    </p:cTn>
+                  </p:par>
+                  <p:par>
+                    <p:cTn id="30" fill="hold">
+                      <p:stCondLst>
+                        <p:cond delay="indefinite"/>
+                      </p:stCondLst>
+                      <p:childTnLst>
+                        <p:par>
+                          <p:cTn id="31" fill="hold">
+                            <p:stCondLst>
+                              <p:cond delay="0"/>
+                            </p:stCondLst>
+                            <p:childTnLst>
+                              <p:par>
+                                <p:cTn id="32" presetID="30" presetClass="entr" presetSubtype="0" fill="hold" grpId="0" nodeType="clickEffect">
+                                  <p:stCondLst>
+                                    <p:cond delay="0"/>
+                                  </p:stCondLst>
+                                  <p:childTnLst>
+                                    <p:set>
+                                      <p:cBhvr>
+                                        <p:cTn id="33" dur="1" fill="hold">
+                                          <p:stCondLst>
+                                            <p:cond delay="0"/>
+                                          </p:stCondLst>
+                                        </p:cTn>
+                                        <p:tgtEl>
+                                          <p:spTgt spid="7"/>
+                                        </p:tgtEl>
+                                        <p:attrNameLst>
+                                          <p:attrName>style.visibility</p:attrName>
+                                        </p:attrNameLst>
+                                      </p:cBhvr>
+                                      <p:to>
+                                        <p:strVal val="visible"/>
+                                      </p:to>
+                                    </p:set>
+                                    <p:animEffect transition="in" filter="fade">
+                                      <p:cBhvr>
+                                        <p:cTn id="34" dur="800" decel="100000"/>
+                                        <p:tgtEl>
+                                          <p:spTgt spid="7"/>
+                                        </p:tgtEl>
+                                      </p:cBhvr>
+                                    </p:animEffect>
+                                    <p:anim calcmode="lin" valueType="num">
+                                      <p:cBhvr>
+                                        <p:cTn id="35" dur="800" decel="100000" fill="hold"/>
+                                        <p:tgtEl>
+                                          <p:spTgt spid="7"/>
+                                        </p:tgtEl>
+                                        <p:attrNameLst>
+                                          <p:attrName>style.rotation</p:attrName>
+                                        </p:attrNameLst>
+                                      </p:cBhvr>
+                                      <p:tavLst>
+                                        <p:tav tm="0">
+                                          <p:val>
+                                            <p:fltVal val="-90"/>
+                                          </p:val>
+                                        </p:tav>
+                                        <p:tav tm="100000">
+                                          <p:val>
+                                            <p:fltVal val="0"/>
+                                          </p:val>
+                                        </p:tav>
+                                      </p:tavLst>
+                                    </p:anim>
+                                    <p:anim calcmode="lin" valueType="num">
+                                      <p:cBhvr>
+                                        <p:cTn id="36" dur="800" decel="100000" fill="hold"/>
+                                        <p:tgtEl>
+                                          <p:spTgt spid="7"/>
+                                        </p:tgtEl>
+                                        <p:attrNameLst>
+                                          <p:attrName>ppt_x</p:attrName>
+                                        </p:attrNameLst>
+                                      </p:cBhvr>
+                                      <p:tavLst>
+                                        <p:tav tm="0">
+                                          <p:val>
+                                            <p:strVal val="#ppt_x+0.4"/>
+                                          </p:val>
+                                        </p:tav>
+                                        <p:tav tm="100000">
+                                          <p:val>
+                                            <p:strVal val="#ppt_x-0.05"/>
+                                          </p:val>
+                                        </p:tav>
+                                      </p:tavLst>
+                                    </p:anim>
+                                    <p:anim calcmode="lin" valueType="num">
+                                      <p:cBhvr>
+                                        <p:cTn id="37" dur="800" decel="100000" fill="hold"/>
+                                        <p:tgtEl>
+                                          <p:spTgt spid="7"/>
+                                        </p:tgtEl>
+                                        <p:attrNameLst>
+                                          <p:attrName>ppt_y</p:attrName>
+                                        </p:attrNameLst>
+                                      </p:cBhvr>
+                                      <p:tavLst>
+                                        <p:tav tm="0">
+                                          <p:val>
+                                            <p:strVal val="#ppt_y-0.4"/>
+                                          </p:val>
+                                        </p:tav>
+                                        <p:tav tm="100000">
+                                          <p:val>
+                                            <p:strVal val="#ppt_y+0.1"/>
+                                          </p:val>
+                                        </p:tav>
+                                      </p:tavLst>
+                                    </p:anim>
+                                    <p:anim calcmode="lin" valueType="num">
+                                      <p:cBhvr>
+                                        <p:cTn id="38" dur="200" accel="100000" fill="hold">
+                                          <p:stCondLst>
+                                            <p:cond delay="800"/>
+                                          </p:stCondLst>
+                                        </p:cTn>
+                                        <p:tgtEl>
+                                          <p:spTgt spid="7"/>
+                                        </p:tgtEl>
+                                        <p:attrNameLst>
+                                          <p:attrName>ppt_x</p:attrName>
+                                        </p:attrNameLst>
+                                      </p:cBhvr>
+                                      <p:tavLst>
+                                        <p:tav tm="0">
+                                          <p:val>
+                                            <p:strVal val="#ppt_x-0.05"/>
+                                          </p:val>
+                                        </p:tav>
+                                        <p:tav tm="100000">
+                                          <p:val>
+                                            <p:strVal val="#ppt_x"/>
+                                          </p:val>
+                                        </p:tav>
+                                      </p:tavLst>
+                                    </p:anim>
+                                    <p:anim calcmode="lin" valueType="num">
+                                      <p:cBhvr>
+                                        <p:cTn id="39" dur="200" accel="100000" fill="hold">
+                                          <p:stCondLst>
+                                            <p:cond delay="800"/>
+                                          </p:stCondLst>
+                                        </p:cTn>
+                                        <p:tgtEl>
+                                          <p:spTgt spid="7"/>
+                                        </p:tgtEl>
+                                        <p:attrNameLst>
+                                          <p:attrName>ppt_y</p:attrName>
+                                        </p:attrNameLst>
+                                      </p:cBhvr>
+                                      <p:tavLst>
+                                        <p:tav tm="0">
+                                          <p:val>
+                                            <p:strVal val="#ppt_y+0.1"/>
+                                          </p:val>
+                                        </p:tav>
+                                        <p:tav tm="100000">
+                                          <p:val>
+                                            <p:strVal val="#ppt_y"/>
+                                          </p:val>
+                                        </p:tav>
+                                      </p:tavLst>
+                                    </p:anim>
+                                  </p:childTnLst>
+                                </p:cTn>
+                              </p:par>
+                            </p:childTnLst>
+                          </p:cTn>
+                        </p:par>
+                      </p:childTnLst>
+                    </p:cTn>
+                  </p:par>
+                </p:childTnLst>
+              </p:cTn>
+              <p:prevCondLst>
+                <p:cond evt="onPrev" delay="0">
+                  <p:tgtEl>
+                    <p:sldTgt/>
+                  </p:tgtEl>
+                </p:cond>
+              </p:prevCondLst>
+              <p:nextCondLst>
+                <p:cond evt="onNext" delay="0">
+                  <p:tgtEl>
+                    <p:sldTgt/>
+                  </p:tgtEl>
+                </p:cond>
+              </p:nextCondLst>
+            </p:seq>
+          </p:childTnLst>
+        </p:cTn>
+      </p:par>
+    </p:tnLst>
+    <p:bldLst>
+      <p:bldP spid="3" grpId="0" build="p"/>
+      <p:bldP spid="6" grpId="0"/>
+      <p:bldP spid="7" grpId="0"/>
+    </p:bldLst>
+  </p:timing>
+</p:sld>
+</file>
+
+<file path=ppt/slides/slide27.xml><?xml version="1.0" encoding="utf-8"?>
+<p:sld xmlns:a="http://schemas.openxmlformats.org/drawingml/2006/main" xmlns:r="http://schemas.openxmlformats.org/officeDocument/2006/relationships" xmlns:p="http://schemas.openxmlformats.org/presentationml/2006/main">
+  <p:cSld>
+    <p:spTree>
+      <p:nvGrpSpPr>
+        <p:cNvPr id="1" name=""/>
+        <p:cNvGrpSpPr/>
+        <p:nvPr/>
+      </p:nvGrpSpPr>
+      <p:grpSpPr>
+        <a:xfrm>
+          <a:off x="0" y="0"/>
+          <a:ext cx="0" cy="0"/>
+          <a:chOff x="0" y="0"/>
+          <a:chExt cx="0" cy="0"/>
+        </a:xfrm>
+      </p:grpSpPr>
+      <p:sp>
+        <p:nvSpPr>
+          <p:cNvPr id="2" name="Title 1">
+            <a:extLst>
+              <a:ext uri="{FF2B5EF4-FFF2-40B4-BE49-F238E27FC236}">
+                <a16:creationId xmlns:a16="http://schemas.microsoft.com/office/drawing/2014/main" id="{E58760D6-D269-4945-B1A4-694876E82262}"/>
+              </a:ext>
+            </a:extLst>
+          </p:cNvPr>
+          <p:cNvSpPr>
+            <a:spLocks noGrp="1"/>
+          </p:cNvSpPr>
+          <p:nvPr>
+            <p:ph type="title"/>
+          </p:nvPr>
+        </p:nvSpPr>
+        <p:spPr/>
+        <p:txBody>
+          <a:bodyPr/>
+          <a:lstStyle/>
+          <a:p>
+            <a:pPr algn="ctr"/>
+            <a:r>
+              <a:rPr lang="en-US" b="1" dirty="0"/>
+              <a:t>5 Minute task</a:t>
+            </a:r>
+          </a:p>
+        </p:txBody>
+      </p:sp>
+      <p:sp>
+        <p:nvSpPr>
+          <p:cNvPr id="3" name="Content Placeholder 2">
+            <a:extLst>
+              <a:ext uri="{FF2B5EF4-FFF2-40B4-BE49-F238E27FC236}">
+                <a16:creationId xmlns:a16="http://schemas.microsoft.com/office/drawing/2014/main" id="{EEFD4948-5517-1945-853A-517362BFEC57}"/>
+              </a:ext>
+            </a:extLst>
+          </p:cNvPr>
+          <p:cNvSpPr>
+            <a:spLocks noGrp="1"/>
+          </p:cNvSpPr>
+          <p:nvPr>
+            <p:ph idx="1"/>
+          </p:nvPr>
+        </p:nvSpPr>
+        <p:spPr/>
+        <p:txBody>
+          <a:bodyPr/>
+          <a:lstStyle/>
+          <a:p>
+            <a:r>
+              <a:rPr lang="en-US" b="1" dirty="0"/>
+              <a:t>Stop the illegal input!</a:t>
+            </a:r>
+          </a:p>
+          <a:p>
+            <a:endParaRPr lang="en-US" b="1" dirty="0"/>
+          </a:p>
+          <a:p>
+            <a:r>
+              <a:rPr lang="en-US" dirty="0"/>
+              <a:t>Construct a function that informs us if a number was an input</a:t>
+            </a:r>
+          </a:p>
+          <a:p>
+            <a:endParaRPr lang="en-US" b="1" dirty="0"/>
+          </a:p>
+          <a:p>
+            <a:r>
+              <a:rPr lang="en-US" dirty="0"/>
+              <a:t>You may use any means necessary, but remember what we just talked about</a:t>
+            </a:r>
+          </a:p>
+          <a:p>
+            <a:pPr lvl="1"/>
+            <a:r>
+              <a:rPr lang="en-US" dirty="0"/>
+              <a:t>It will help you a lot!</a:t>
+            </a:r>
+          </a:p>
+        </p:txBody>
+      </p:sp>
+      <p:pic>
+        <p:nvPicPr>
+          <p:cNvPr id="5" name="Graphic 4" descr="Robber">
+            <a:extLst>
+              <a:ext uri="{FF2B5EF4-FFF2-40B4-BE49-F238E27FC236}">
+                <a16:creationId xmlns:a16="http://schemas.microsoft.com/office/drawing/2014/main" id="{95EE983A-34D5-8945-9625-4D8F61AFDF5A}"/>
+              </a:ext>
+            </a:extLst>
+          </p:cNvPr>
+          <p:cNvPicPr>
+            <a:picLocks noChangeAspect="1"/>
+          </p:cNvPicPr>
+          <p:nvPr/>
+        </p:nvPicPr>
+        <p:blipFill>
+          <a:blip r:embed="rId2">
+            <a:extLst>
+              <a:ext uri="{96DAC541-7B7A-43D3-8B79-37D633B846F1}">
+                <asvg:svgBlip xmlns:asvg="http://schemas.microsoft.com/office/drawing/2016/SVG/main" r:embed="rId3"/>
+              </a:ext>
+            </a:extLst>
+          </a:blip>
+          <a:stretch>
+            <a:fillRect/>
+          </a:stretch>
+        </p:blipFill>
+        <p:spPr>
+          <a:xfrm>
+            <a:off x="7726678" y="2097088"/>
+            <a:ext cx="914401" cy="914401"/>
+          </a:xfrm>
+          <a:prstGeom prst="rect">
+            <a:avLst/>
+          </a:prstGeom>
+        </p:spPr>
+      </p:pic>
+      <p:pic>
+        <p:nvPicPr>
+          <p:cNvPr id="7" name="Graphic 6" descr="Siren">
+            <a:extLst>
+              <a:ext uri="{FF2B5EF4-FFF2-40B4-BE49-F238E27FC236}">
+                <a16:creationId xmlns:a16="http://schemas.microsoft.com/office/drawing/2014/main" id="{033041FD-8F4F-7144-95D7-5B56E46DFED5}"/>
+              </a:ext>
+            </a:extLst>
+          </p:cNvPr>
+          <p:cNvPicPr>
+            <a:picLocks noChangeAspect="1"/>
+          </p:cNvPicPr>
+          <p:nvPr/>
+        </p:nvPicPr>
+        <p:blipFill>
+          <a:blip r:embed="rId4">
+            <a:extLst>
+              <a:ext uri="{96DAC541-7B7A-43D3-8B79-37D633B846F1}">
+                <asvg:svgBlip xmlns:asvg="http://schemas.microsoft.com/office/drawing/2016/SVG/main" r:embed="rId5"/>
+              </a:ext>
+            </a:extLst>
+          </a:blip>
+          <a:stretch>
+            <a:fillRect/>
+          </a:stretch>
+        </p:blipFill>
+        <p:spPr>
+          <a:xfrm>
+            <a:off x="5971681" y="2097088"/>
+            <a:ext cx="914400" cy="914400"/>
+          </a:xfrm>
+          <a:prstGeom prst="rect">
+            <a:avLst/>
+          </a:prstGeom>
+        </p:spPr>
+      </p:pic>
+      <p:pic>
+        <p:nvPicPr>
+          <p:cNvPr id="8" name="Graphic 7" descr="Siren">
+            <a:extLst>
+              <a:ext uri="{FF2B5EF4-FFF2-40B4-BE49-F238E27FC236}">
+                <a16:creationId xmlns:a16="http://schemas.microsoft.com/office/drawing/2014/main" id="{56A36691-4F66-7843-A3D9-F4F99E44B9B1}"/>
+              </a:ext>
+            </a:extLst>
+          </p:cNvPr>
+          <p:cNvPicPr>
+            <a:picLocks noChangeAspect="1"/>
+          </p:cNvPicPr>
+          <p:nvPr/>
+        </p:nvPicPr>
+        <p:blipFill>
+          <a:blip r:embed="rId6">
+            <a:extLst>
+              <a:ext uri="{96DAC541-7B7A-43D3-8B79-37D633B846F1}">
+                <asvg:svgBlip xmlns:asvg="http://schemas.microsoft.com/office/drawing/2016/SVG/main" r:embed="rId7"/>
+              </a:ext>
+            </a:extLst>
+          </a:blip>
+          <a:stretch>
+            <a:fillRect/>
+          </a:stretch>
+        </p:blipFill>
+        <p:spPr>
+          <a:xfrm>
+            <a:off x="4848721" y="2097088"/>
+            <a:ext cx="914400" cy="914400"/>
+          </a:xfrm>
+          <a:prstGeom prst="rect">
+            <a:avLst/>
+          </a:prstGeom>
+        </p:spPr>
+      </p:pic>
+      <p:pic>
+        <p:nvPicPr>
+          <p:cNvPr id="10" name="Graphic 9" descr="Handcuffs">
+            <a:extLst>
+              <a:ext uri="{FF2B5EF4-FFF2-40B4-BE49-F238E27FC236}">
+                <a16:creationId xmlns:a16="http://schemas.microsoft.com/office/drawing/2014/main" id="{C1DCBAC7-E8BC-B74A-A251-2C841D490B69}"/>
+              </a:ext>
+            </a:extLst>
+          </p:cNvPr>
+          <p:cNvPicPr>
+            <a:picLocks noChangeAspect="1"/>
+          </p:cNvPicPr>
+          <p:nvPr/>
+        </p:nvPicPr>
+        <p:blipFill>
+          <a:blip r:embed="rId8">
+            <a:extLst>
+              <a:ext uri="{96DAC541-7B7A-43D3-8B79-37D633B846F1}">
+                <asvg:svgBlip xmlns:asvg="http://schemas.microsoft.com/office/drawing/2016/SVG/main" r:embed="rId9"/>
+              </a:ext>
+            </a:extLst>
+          </a:blip>
+          <a:stretch>
+            <a:fillRect/>
+          </a:stretch>
+        </p:blipFill>
+        <p:spPr>
+          <a:xfrm>
+            <a:off x="11047411" y="4434841"/>
+            <a:ext cx="914400" cy="914400"/>
+          </a:xfrm>
+          <a:prstGeom prst="rect">
+            <a:avLst/>
+          </a:prstGeom>
+        </p:spPr>
+      </p:pic>
+    </p:spTree>
+    <p:extLst>
+      <p:ext uri="{BB962C8B-B14F-4D97-AF65-F5344CB8AC3E}">
+        <p14:creationId xmlns:p14="http://schemas.microsoft.com/office/powerpoint/2010/main" val="4149200172"/>
+      </p:ext>
+    </p:extLst>
+  </p:cSld>
+  <p:clrMapOvr>
+    <a:masterClrMapping/>
+  </p:clrMapOvr>
+  <p:timing>
+    <p:tnLst>
+      <p:par>
+        <p:cTn id="1" dur="indefinite" restart="never" nodeType="tmRoot">
+          <p:childTnLst>
+            <p:seq concurrent="1" nextAc="seek">
+              <p:cTn id="2" dur="indefinite" nodeType="mainSeq">
+                <p:childTnLst>
+                  <p:par>
+                    <p:cTn id="3" fill="hold">
+                      <p:stCondLst>
+                        <p:cond delay="indefinite"/>
+                      </p:stCondLst>
+                      <p:childTnLst>
+                        <p:par>
+                          <p:cTn id="4" fill="hold">
+                            <p:stCondLst>
+                              <p:cond delay="0"/>
+                            </p:stCondLst>
+                            <p:childTnLst>
+                              <p:par>
+                                <p:cTn id="5" presetID="2" presetClass="entr" presetSubtype="4" fill="hold" grpId="0" nodeType="clickEffect">
+                                  <p:stCondLst>
+                                    <p:cond delay="0"/>
+                                  </p:stCondLst>
+                                  <p:childTnLst>
+                                    <p:set>
+                                      <p:cBhvr>
+                                        <p:cTn id="6" dur="1" fill="hold">
+                                          <p:stCondLst>
+                                            <p:cond delay="0"/>
+                                          </p:stCondLst>
+                                        </p:cTn>
+                                        <p:tgtEl>
+                                          <p:spTgt spid="3">
+                                            <p:txEl>
+                                              <p:pRg st="0" end="0"/>
+                                            </p:txEl>
+                                          </p:spTgt>
+                                        </p:tgtEl>
+                                        <p:attrNameLst>
+                                          <p:attrName>style.visibility</p:attrName>
+                                        </p:attrNameLst>
+                                      </p:cBhvr>
+                                      <p:to>
+                                        <p:strVal val="visible"/>
+                                      </p:to>
+                                    </p:set>
+                                    <p:anim calcmode="lin" valueType="num">
+                                      <p:cBhvr additive="base">
+                                        <p:cTn id="7" dur="500" fill="hold"/>
+                                        <p:tgtEl>
+                                          <p:spTgt spid="3">
+                                            <p:txEl>
+                                              <p:pRg st="0" end="0"/>
+                                            </p:txEl>
+                                          </p:spTgt>
+                                        </p:tgtEl>
+                                        <p:attrNameLst>
+                                          <p:attrName>ppt_x</p:attrName>
+                                        </p:attrNameLst>
+                                      </p:cBhvr>
+                                      <p:tavLst>
+                                        <p:tav tm="0">
+                                          <p:val>
+                                            <p:strVal val="#ppt_x"/>
+                                          </p:val>
+                                        </p:tav>
+                                        <p:tav tm="100000">
+                                          <p:val>
+                                            <p:strVal val="#ppt_x"/>
+                                          </p:val>
+                                        </p:tav>
+                                      </p:tavLst>
+                                    </p:anim>
+                                    <p:anim calcmode="lin" valueType="num">
+                                      <p:cBhvr additive="base">
+                                        <p:cTn id="8" dur="500" fill="hold"/>
+                                        <p:tgtEl>
+                                          <p:spTgt spid="3">
+                                            <p:txEl>
+                                              <p:pRg st="0" end="0"/>
+                                            </p:txEl>
+                                          </p:spTgt>
+                                        </p:tgtEl>
+                                        <p:attrNameLst>
+                                          <p:attrName>ppt_y</p:attrName>
+                                        </p:attrNameLst>
+                                      </p:cBhvr>
+                                      <p:tavLst>
+                                        <p:tav tm="0">
+                                          <p:val>
+                                            <p:strVal val="1+#ppt_h/2"/>
+                                          </p:val>
+                                        </p:tav>
+                                        <p:tav tm="100000">
+                                          <p:val>
+                                            <p:strVal val="#ppt_y"/>
+                                          </p:val>
+                                        </p:tav>
+                                      </p:tavLst>
+                                    </p:anim>
+                                  </p:childTnLst>
+                                </p:cTn>
+                              </p:par>
+                              <p:par>
+                                <p:cTn id="9" presetID="2" presetClass="entr" presetSubtype="8" fill="hold" nodeType="withEffect">
+                                  <p:stCondLst>
+                                    <p:cond delay="0"/>
+                                  </p:stCondLst>
+                                  <p:childTnLst>
+                                    <p:set>
+                                      <p:cBhvr>
+                                        <p:cTn id="10" dur="1" fill="hold">
+                                          <p:stCondLst>
+                                            <p:cond delay="0"/>
+                                          </p:stCondLst>
+                                        </p:cTn>
+                                        <p:tgtEl>
+                                          <p:spTgt spid="5"/>
+                                        </p:tgtEl>
+                                        <p:attrNameLst>
+                                          <p:attrName>style.visibility</p:attrName>
+                                        </p:attrNameLst>
+                                      </p:cBhvr>
+                                      <p:to>
+                                        <p:strVal val="visible"/>
+                                      </p:to>
+                                    </p:set>
+                                    <p:anim calcmode="lin" valueType="num">
+                                      <p:cBhvr additive="base">
+                                        <p:cTn id="11" dur="500" fill="hold"/>
+                                        <p:tgtEl>
+                                          <p:spTgt spid="5"/>
+                                        </p:tgtEl>
+                                        <p:attrNameLst>
+                                          <p:attrName>ppt_x</p:attrName>
+                                        </p:attrNameLst>
+                                      </p:cBhvr>
+                                      <p:tavLst>
+                                        <p:tav tm="0">
+                                          <p:val>
+                                            <p:strVal val="0-#ppt_w/2"/>
+                                          </p:val>
+                                        </p:tav>
+                                        <p:tav tm="100000">
+                                          <p:val>
+                                            <p:strVal val="#ppt_x"/>
+                                          </p:val>
+                                        </p:tav>
+                                      </p:tavLst>
+                                    </p:anim>
+                                    <p:anim calcmode="lin" valueType="num">
+                                      <p:cBhvr additive="base">
+                                        <p:cTn id="12" dur="500" fill="hold"/>
+                                        <p:tgtEl>
+                                          <p:spTgt spid="5"/>
+                                        </p:tgtEl>
+                                        <p:attrNameLst>
+                                          <p:attrName>ppt_y</p:attrName>
+                                        </p:attrNameLst>
+                                      </p:cBhvr>
+                                      <p:tavLst>
+                                        <p:tav tm="0">
+                                          <p:val>
+                                            <p:strVal val="#ppt_y"/>
+                                          </p:val>
+                                        </p:tav>
+                                        <p:tav tm="100000">
+                                          <p:val>
+                                            <p:strVal val="#ppt_y"/>
+                                          </p:val>
+                                        </p:tav>
+                                      </p:tavLst>
+                                    </p:anim>
+                                  </p:childTnLst>
+                                </p:cTn>
+                              </p:par>
+                              <p:par>
+                                <p:cTn id="13" presetID="2" presetClass="entr" presetSubtype="8" fill="hold" nodeType="withEffect">
+                                  <p:stCondLst>
+                                    <p:cond delay="0"/>
+                                  </p:stCondLst>
+                                  <p:childTnLst>
+                                    <p:set>
+                                      <p:cBhvr>
+                                        <p:cTn id="14" dur="1" fill="hold">
+                                          <p:stCondLst>
+                                            <p:cond delay="0"/>
+                                          </p:stCondLst>
+                                        </p:cTn>
+                                        <p:tgtEl>
+                                          <p:spTgt spid="7"/>
+                                        </p:tgtEl>
+                                        <p:attrNameLst>
+                                          <p:attrName>style.visibility</p:attrName>
+                                        </p:attrNameLst>
+                                      </p:cBhvr>
+                                      <p:to>
+                                        <p:strVal val="visible"/>
+                                      </p:to>
+                                    </p:set>
+                                    <p:anim calcmode="lin" valueType="num">
+                                      <p:cBhvr additive="base">
+                                        <p:cTn id="15" dur="500" fill="hold"/>
+                                        <p:tgtEl>
+                                          <p:spTgt spid="7"/>
+                                        </p:tgtEl>
+                                        <p:attrNameLst>
+                                          <p:attrName>ppt_x</p:attrName>
+                                        </p:attrNameLst>
+                                      </p:cBhvr>
+                                      <p:tavLst>
+                                        <p:tav tm="0">
+                                          <p:val>
+                                            <p:strVal val="0-#ppt_w/2"/>
+                                          </p:val>
+                                        </p:tav>
+                                        <p:tav tm="100000">
+                                          <p:val>
+                                            <p:strVal val="#ppt_x"/>
+                                          </p:val>
+                                        </p:tav>
+                                      </p:tavLst>
+                                    </p:anim>
+                                    <p:anim calcmode="lin" valueType="num">
+                                      <p:cBhvr additive="base">
+                                        <p:cTn id="16" dur="500" fill="hold"/>
+                                        <p:tgtEl>
+                                          <p:spTgt spid="7"/>
+                                        </p:tgtEl>
+                                        <p:attrNameLst>
+                                          <p:attrName>ppt_y</p:attrName>
+                                        </p:attrNameLst>
+                                      </p:cBhvr>
+                                      <p:tavLst>
+                                        <p:tav tm="0">
+                                          <p:val>
+                                            <p:strVal val="#ppt_y"/>
+                                          </p:val>
+                                        </p:tav>
+                                        <p:tav tm="100000">
+                                          <p:val>
+                                            <p:strVal val="#ppt_y"/>
+                                          </p:val>
+                                        </p:tav>
+                                      </p:tavLst>
+                                    </p:anim>
+                                  </p:childTnLst>
+                                </p:cTn>
+                              </p:par>
+                              <p:par>
+                                <p:cTn id="17" presetID="26" presetClass="emph" presetSubtype="0" repeatCount="indefinite" fill="hold" nodeType="withEffect">
+                                  <p:stCondLst>
+                                    <p:cond delay="0"/>
+                                  </p:stCondLst>
+                                  <p:childTnLst>
+                                    <p:animEffect transition="out" filter="fade">
+                                      <p:cBhvr>
+                                        <p:cTn id="18" dur="500" tmFilter="0, 0; .2, .5; .8, .5; 1, 0"/>
+                                        <p:tgtEl>
+                                          <p:spTgt spid="7"/>
+                                        </p:tgtEl>
+                                      </p:cBhvr>
+                                    </p:animEffect>
+                                    <p:animScale>
+                                      <p:cBhvr>
+                                        <p:cTn id="19" dur="250" autoRev="1" fill="hold"/>
+                                        <p:tgtEl>
+                                          <p:spTgt spid="7"/>
+                                        </p:tgtEl>
+                                      </p:cBhvr>
+                                      <p:by x="105000" y="105000"/>
+                                    </p:animScale>
+                                  </p:childTnLst>
+                                </p:cTn>
+                              </p:par>
+                              <p:par>
+                                <p:cTn id="20" presetID="2" presetClass="entr" presetSubtype="8" fill="hold" nodeType="withEffect">
+                                  <p:stCondLst>
+                                    <p:cond delay="0"/>
+                                  </p:stCondLst>
+                                  <p:childTnLst>
+                                    <p:set>
+                                      <p:cBhvr>
+                                        <p:cTn id="21" dur="1" fill="hold">
+                                          <p:stCondLst>
+                                            <p:cond delay="0"/>
+                                          </p:stCondLst>
+                                        </p:cTn>
+                                        <p:tgtEl>
+                                          <p:spTgt spid="8"/>
+                                        </p:tgtEl>
+                                        <p:attrNameLst>
+                                          <p:attrName>style.visibility</p:attrName>
+                                        </p:attrNameLst>
+                                      </p:cBhvr>
+                                      <p:to>
+                                        <p:strVal val="visible"/>
+                                      </p:to>
+                                    </p:set>
+                                    <p:anim calcmode="lin" valueType="num">
+                                      <p:cBhvr additive="base">
+                                        <p:cTn id="22" dur="500" fill="hold"/>
+                                        <p:tgtEl>
+                                          <p:spTgt spid="8"/>
+                                        </p:tgtEl>
+                                        <p:attrNameLst>
+                                          <p:attrName>ppt_x</p:attrName>
+                                        </p:attrNameLst>
+                                      </p:cBhvr>
+                                      <p:tavLst>
+                                        <p:tav tm="0">
+                                          <p:val>
+                                            <p:strVal val="0-#ppt_w/2"/>
+                                          </p:val>
+                                        </p:tav>
+                                        <p:tav tm="100000">
+                                          <p:val>
+                                            <p:strVal val="#ppt_x"/>
+                                          </p:val>
+                                        </p:tav>
+                                      </p:tavLst>
+                                    </p:anim>
+                                    <p:anim calcmode="lin" valueType="num">
+                                      <p:cBhvr additive="base">
+                                        <p:cTn id="23" dur="500" fill="hold"/>
+                                        <p:tgtEl>
+                                          <p:spTgt spid="8"/>
+                                        </p:tgtEl>
+                                        <p:attrNameLst>
+                                          <p:attrName>ppt_y</p:attrName>
+                                        </p:attrNameLst>
+                                      </p:cBhvr>
+                                      <p:tavLst>
+                                        <p:tav tm="0">
+                                          <p:val>
+                                            <p:strVal val="#ppt_y"/>
+                                          </p:val>
+                                        </p:tav>
+                                        <p:tav tm="100000">
+                                          <p:val>
+                                            <p:strVal val="#ppt_y"/>
+                                          </p:val>
+                                        </p:tav>
+                                      </p:tavLst>
+                                    </p:anim>
+                                  </p:childTnLst>
+                                </p:cTn>
+                              </p:par>
+                              <p:par>
+                                <p:cTn id="24" presetID="26" presetClass="emph" presetSubtype="0" repeatCount="indefinite" fill="hold" nodeType="withEffect">
+                                  <p:stCondLst>
+                                    <p:cond delay="0"/>
+                                  </p:stCondLst>
+                                  <p:childTnLst>
+                                    <p:animEffect transition="out" filter="fade">
+                                      <p:cBhvr>
+                                        <p:cTn id="25" dur="500" tmFilter="0, 0; .2, .5; .8, .5; 1, 0"/>
+                                        <p:tgtEl>
+                                          <p:spTgt spid="8"/>
+                                        </p:tgtEl>
+                                      </p:cBhvr>
+                                    </p:animEffect>
+                                    <p:animScale>
+                                      <p:cBhvr>
+                                        <p:cTn id="26" dur="250" autoRev="1" fill="hold"/>
+                                        <p:tgtEl>
+                                          <p:spTgt spid="8"/>
+                                        </p:tgtEl>
+                                      </p:cBhvr>
+                                      <p:by x="105000" y="105000"/>
+                                    </p:animScale>
+                                  </p:childTnLst>
+                                </p:cTn>
+                              </p:par>
+                            </p:childTnLst>
+                          </p:cTn>
+                        </p:par>
+                      </p:childTnLst>
+                    </p:cTn>
+                  </p:par>
+                  <p:par>
+                    <p:cTn id="27" fill="hold">
+                      <p:stCondLst>
+                        <p:cond delay="indefinite"/>
+                      </p:stCondLst>
+                      <p:childTnLst>
+                        <p:par>
+                          <p:cTn id="28" fill="hold">
+                            <p:stCondLst>
+                              <p:cond delay="0"/>
+                            </p:stCondLst>
+                            <p:childTnLst>
+                              <p:par>
+                                <p:cTn id="29" presetID="2" presetClass="entr" presetSubtype="4" fill="hold" grpId="0" nodeType="clickEffect">
+                                  <p:stCondLst>
+                                    <p:cond delay="0"/>
+                                  </p:stCondLst>
+                                  <p:childTnLst>
+                                    <p:set>
+                                      <p:cBhvr>
+                                        <p:cTn id="30" dur="1" fill="hold">
+                                          <p:stCondLst>
+                                            <p:cond delay="0"/>
+                                          </p:stCondLst>
+                                        </p:cTn>
+                                        <p:tgtEl>
+                                          <p:spTgt spid="3">
+                                            <p:txEl>
+                                              <p:pRg st="2" end="2"/>
+                                            </p:txEl>
+                                          </p:spTgt>
+                                        </p:tgtEl>
+                                        <p:attrNameLst>
+                                          <p:attrName>style.visibility</p:attrName>
+                                        </p:attrNameLst>
+                                      </p:cBhvr>
+                                      <p:to>
+                                        <p:strVal val="visible"/>
+                                      </p:to>
+                                    </p:set>
+                                    <p:anim calcmode="lin" valueType="num">
+                                      <p:cBhvr additive="base">
+                                        <p:cTn id="31" dur="500" fill="hold"/>
+                                        <p:tgtEl>
+                                          <p:spTgt spid="3">
+                                            <p:txEl>
+                                              <p:pRg st="2" end="2"/>
+                                            </p:txEl>
+                                          </p:spTgt>
+                                        </p:tgtEl>
+                                        <p:attrNameLst>
+                                          <p:attrName>ppt_x</p:attrName>
+                                        </p:attrNameLst>
+                                      </p:cBhvr>
+                                      <p:tavLst>
+                                        <p:tav tm="0">
+                                          <p:val>
+                                            <p:strVal val="#ppt_x"/>
+                                          </p:val>
+                                        </p:tav>
+                                        <p:tav tm="100000">
+                                          <p:val>
+                                            <p:strVal val="#ppt_x"/>
+                                          </p:val>
+                                        </p:tav>
+                                      </p:tavLst>
+                                    </p:anim>
+                                    <p:anim calcmode="lin" valueType="num">
+                                      <p:cBhvr additive="base">
+                                        <p:cTn id="32" dur="500" fill="hold"/>
+                                        <p:tgtEl>
+                                          <p:spTgt spid="3">
+                                            <p:txEl>
+                                              <p:pRg st="2" end="2"/>
+                                            </p:txEl>
+                                          </p:spTgt>
+                                        </p:tgtEl>
+                                        <p:attrNameLst>
+                                          <p:attrName>ppt_y</p:attrName>
+                                        </p:attrNameLst>
+                                      </p:cBhvr>
+                                      <p:tavLst>
+                                        <p:tav tm="0">
+                                          <p:val>
+                                            <p:strVal val="1+#ppt_h/2"/>
+                                          </p:val>
+                                        </p:tav>
+                                        <p:tav tm="100000">
+                                          <p:val>
+                                            <p:strVal val="#ppt_y"/>
+                                          </p:val>
+                                        </p:tav>
+                                      </p:tavLst>
+                                    </p:anim>
+                                  </p:childTnLst>
+                                </p:cTn>
+                              </p:par>
+                            </p:childTnLst>
+                          </p:cTn>
+                        </p:par>
+                      </p:childTnLst>
+                    </p:cTn>
+                  </p:par>
+                  <p:par>
+                    <p:cTn id="33" fill="hold">
+                      <p:stCondLst>
+                        <p:cond delay="indefinite"/>
+                      </p:stCondLst>
+                      <p:childTnLst>
+                        <p:par>
+                          <p:cTn id="34" fill="hold">
+                            <p:stCondLst>
+                              <p:cond delay="0"/>
+                            </p:stCondLst>
+                            <p:childTnLst>
+                              <p:par>
+                                <p:cTn id="35" presetID="2" presetClass="entr" presetSubtype="4" fill="hold" grpId="0" nodeType="clickEffect">
+                                  <p:stCondLst>
+                                    <p:cond delay="0"/>
+                                  </p:stCondLst>
+                                  <p:childTnLst>
+                                    <p:set>
+                                      <p:cBhvr>
+                                        <p:cTn id="36" dur="1" fill="hold">
+                                          <p:stCondLst>
+                                            <p:cond delay="0"/>
+                                          </p:stCondLst>
+                                        </p:cTn>
+                                        <p:tgtEl>
+                                          <p:spTgt spid="3">
+                                            <p:txEl>
+                                              <p:pRg st="4" end="4"/>
+                                            </p:txEl>
+                                          </p:spTgt>
+                                        </p:tgtEl>
+                                        <p:attrNameLst>
+                                          <p:attrName>style.visibility</p:attrName>
+                                        </p:attrNameLst>
+                                      </p:cBhvr>
+                                      <p:to>
+                                        <p:strVal val="visible"/>
+                                      </p:to>
+                                    </p:set>
+                                    <p:anim calcmode="lin" valueType="num">
+                                      <p:cBhvr additive="base">
+                                        <p:cTn id="37" dur="500" fill="hold"/>
+                                        <p:tgtEl>
+                                          <p:spTgt spid="3">
+                                            <p:txEl>
+                                              <p:pRg st="4" end="4"/>
+                                            </p:txEl>
+                                          </p:spTgt>
+                                        </p:tgtEl>
+                                        <p:attrNameLst>
+                                          <p:attrName>ppt_x</p:attrName>
+                                        </p:attrNameLst>
+                                      </p:cBhvr>
+                                      <p:tavLst>
+                                        <p:tav tm="0">
+                                          <p:val>
+                                            <p:strVal val="#ppt_x"/>
+                                          </p:val>
+                                        </p:tav>
+                                        <p:tav tm="100000">
+                                          <p:val>
+                                            <p:strVal val="#ppt_x"/>
+                                          </p:val>
+                                        </p:tav>
+                                      </p:tavLst>
+                                    </p:anim>
+                                    <p:anim calcmode="lin" valueType="num">
+                                      <p:cBhvr additive="base">
+                                        <p:cTn id="38" dur="500" fill="hold"/>
+                                        <p:tgtEl>
+                                          <p:spTgt spid="3">
+                                            <p:txEl>
+                                              <p:pRg st="4" end="4"/>
+                                            </p:txEl>
+                                          </p:spTgt>
+                                        </p:tgtEl>
+                                        <p:attrNameLst>
+                                          <p:attrName>ppt_y</p:attrName>
+                                        </p:attrNameLst>
+                                      </p:cBhvr>
+                                      <p:tavLst>
+                                        <p:tav tm="0">
+                                          <p:val>
+                                            <p:strVal val="1+#ppt_h/2"/>
+                                          </p:val>
+                                        </p:tav>
+                                        <p:tav tm="100000">
+                                          <p:val>
+                                            <p:strVal val="#ppt_y"/>
+                                          </p:val>
+                                        </p:tav>
+                                      </p:tavLst>
+                                    </p:anim>
+                                  </p:childTnLst>
+                                </p:cTn>
+                              </p:par>
+                              <p:par>
+                                <p:cTn id="39" presetID="2" presetClass="entr" presetSubtype="4" fill="hold" grpId="0" nodeType="withEffect">
+                                  <p:stCondLst>
+                                    <p:cond delay="0"/>
+                                  </p:stCondLst>
+                                  <p:childTnLst>
+                                    <p:set>
+                                      <p:cBhvr>
+                                        <p:cTn id="40" dur="1" fill="hold">
+                                          <p:stCondLst>
+                                            <p:cond delay="0"/>
+                                          </p:stCondLst>
+                                        </p:cTn>
+                                        <p:tgtEl>
+                                          <p:spTgt spid="3">
+                                            <p:txEl>
+                                              <p:pRg st="5" end="5"/>
+                                            </p:txEl>
+                                          </p:spTgt>
+                                        </p:tgtEl>
+                                        <p:attrNameLst>
+                                          <p:attrName>style.visibility</p:attrName>
+                                        </p:attrNameLst>
+                                      </p:cBhvr>
+                                      <p:to>
+                                        <p:strVal val="visible"/>
+                                      </p:to>
+                                    </p:set>
+                                    <p:anim calcmode="lin" valueType="num">
+                                      <p:cBhvr additive="base">
+                                        <p:cTn id="41" dur="500" fill="hold"/>
+                                        <p:tgtEl>
+                                          <p:spTgt spid="3">
+                                            <p:txEl>
+                                              <p:pRg st="5" end="5"/>
+                                            </p:txEl>
+                                          </p:spTgt>
+                                        </p:tgtEl>
+                                        <p:attrNameLst>
+                                          <p:attrName>ppt_x</p:attrName>
+                                        </p:attrNameLst>
+                                      </p:cBhvr>
+                                      <p:tavLst>
+                                        <p:tav tm="0">
+                                          <p:val>
+                                            <p:strVal val="#ppt_x"/>
+                                          </p:val>
+                                        </p:tav>
+                                        <p:tav tm="100000">
+                                          <p:val>
+                                            <p:strVal val="#ppt_x"/>
+                                          </p:val>
+                                        </p:tav>
+                                      </p:tavLst>
+                                    </p:anim>
+                                    <p:anim calcmode="lin" valueType="num">
+                                      <p:cBhvr additive="base">
+                                        <p:cTn id="42" dur="500" fill="hold"/>
+                                        <p:tgtEl>
+                                          <p:spTgt spid="3">
+                                            <p:txEl>
+                                              <p:pRg st="5" end="5"/>
+                                            </p:txEl>
+                                          </p:spTgt>
+                                        </p:tgtEl>
+                                        <p:attrNameLst>
+                                          <p:attrName>ppt_y</p:attrName>
+                                        </p:attrNameLst>
+                                      </p:cBhvr>
+                                      <p:tavLst>
+                                        <p:tav tm="0">
+                                          <p:val>
+                                            <p:strVal val="1+#ppt_h/2"/>
+                                          </p:val>
+                                        </p:tav>
+                                        <p:tav tm="100000">
+                                          <p:val>
+                                            <p:strVal val="#ppt_y"/>
+                                          </p:val>
+                                        </p:tav>
+                                      </p:tavLst>
+                                    </p:anim>
+                                  </p:childTnLst>
+                                </p:cTn>
+                              </p:par>
+                              <p:par>
+                                <p:cTn id="43" presetID="31" presetClass="entr" presetSubtype="0" fill="hold" nodeType="withEffect">
+                                  <p:stCondLst>
+                                    <p:cond delay="0"/>
+                                  </p:stCondLst>
+                                  <p:childTnLst>
+                                    <p:set>
+                                      <p:cBhvr>
+                                        <p:cTn id="44" dur="1" fill="hold">
+                                          <p:stCondLst>
+                                            <p:cond delay="0"/>
+                                          </p:stCondLst>
+                                        </p:cTn>
+                                        <p:tgtEl>
+                                          <p:spTgt spid="10"/>
+                                        </p:tgtEl>
+                                        <p:attrNameLst>
+                                          <p:attrName>style.visibility</p:attrName>
+                                        </p:attrNameLst>
+                                      </p:cBhvr>
+                                      <p:to>
+                                        <p:strVal val="visible"/>
+                                      </p:to>
+                                    </p:set>
+                                    <p:anim calcmode="lin" valueType="num">
+                                      <p:cBhvr>
+                                        <p:cTn id="45" dur="1000" fill="hold"/>
+                                        <p:tgtEl>
+                                          <p:spTgt spid="10"/>
+                                        </p:tgtEl>
+                                        <p:attrNameLst>
+                                          <p:attrName>ppt_w</p:attrName>
+                                        </p:attrNameLst>
+                                      </p:cBhvr>
+                                      <p:tavLst>
+                                        <p:tav tm="0">
+                                          <p:val>
+                                            <p:fltVal val="0"/>
+                                          </p:val>
+                                        </p:tav>
+                                        <p:tav tm="100000">
+                                          <p:val>
+                                            <p:strVal val="#ppt_w"/>
+                                          </p:val>
+                                        </p:tav>
+                                      </p:tavLst>
+                                    </p:anim>
+                                    <p:anim calcmode="lin" valueType="num">
+                                      <p:cBhvr>
+                                        <p:cTn id="46" dur="1000" fill="hold"/>
+                                        <p:tgtEl>
+                                          <p:spTgt spid="10"/>
+                                        </p:tgtEl>
+                                        <p:attrNameLst>
+                                          <p:attrName>ppt_h</p:attrName>
+                                        </p:attrNameLst>
+                                      </p:cBhvr>
+                                      <p:tavLst>
+                                        <p:tav tm="0">
+                                          <p:val>
+                                            <p:fltVal val="0"/>
+                                          </p:val>
+                                        </p:tav>
+                                        <p:tav tm="100000">
+                                          <p:val>
+                                            <p:strVal val="#ppt_h"/>
+                                          </p:val>
+                                        </p:tav>
+                                      </p:tavLst>
+                                    </p:anim>
+                                    <p:anim calcmode="lin" valueType="num">
+                                      <p:cBhvr>
+                                        <p:cTn id="47" dur="1000" fill="hold"/>
+                                        <p:tgtEl>
+                                          <p:spTgt spid="10"/>
+                                        </p:tgtEl>
+                                        <p:attrNameLst>
+                                          <p:attrName>style.rotation</p:attrName>
+                                        </p:attrNameLst>
+                                      </p:cBhvr>
+                                      <p:tavLst>
+                                        <p:tav tm="0">
+                                          <p:val>
+                                            <p:fltVal val="90"/>
+                                          </p:val>
+                                        </p:tav>
+                                        <p:tav tm="100000">
+                                          <p:val>
+                                            <p:fltVal val="0"/>
+                                          </p:val>
+                                        </p:tav>
+                                      </p:tavLst>
+                                    </p:anim>
+                                    <p:animEffect transition="in" filter="fade">
+                                      <p:cBhvr>
+                                        <p:cTn id="48" dur="1000"/>
+                                        <p:tgtEl>
+                                          <p:spTgt spid="10"/>
+                                        </p:tgtEl>
+                                      </p:cBhvr>
+                                    </p:animEffect>
+                                  </p:childTnLst>
+                                </p:cTn>
+                              </p:par>
+                            </p:childTnLst>
+                          </p:cTn>
+                        </p:par>
+                      </p:childTnLst>
+                    </p:cTn>
+                  </p:par>
+                </p:childTnLst>
+              </p:cTn>
+              <p:prevCondLst>
+                <p:cond evt="onPrev" delay="0">
+                  <p:tgtEl>
+                    <p:sldTgt/>
+                  </p:tgtEl>
+                </p:cond>
+              </p:prevCondLst>
+              <p:nextCondLst>
+                <p:cond evt="onNext" delay="0">
+                  <p:tgtEl>
+                    <p:sldTgt/>
+                  </p:tgtEl>
+                </p:cond>
+              </p:nextCondLst>
+            </p:seq>
+          </p:childTnLst>
+        </p:cTn>
+      </p:par>
+    </p:tnLst>
+    <p:bldLst>
+      <p:bldP spid="3" grpId="0" uiExpand="1" build="p"/>
+    </p:bldLst>
+  </p:timing>
+</p:sld>
+</file>
+
+<file path=ppt/slides/slide28.xml><?xml version="1.0" encoding="utf-8"?>
+<p:sld xmlns:a="http://schemas.openxmlformats.org/drawingml/2006/main" xmlns:r="http://schemas.openxmlformats.org/officeDocument/2006/relationships" xmlns:p="http://schemas.openxmlformats.org/presentationml/2006/main">
+  <p:cSld>
+    <p:spTree>
+      <p:nvGrpSpPr>
+        <p:cNvPr id="1" name=""/>
+        <p:cNvGrpSpPr/>
+        <p:nvPr/>
+      </p:nvGrpSpPr>
+      <p:grpSpPr>
+        <a:xfrm>
+          <a:off x="0" y="0"/>
+          <a:ext cx="0" cy="0"/>
+          <a:chOff x="0" y="0"/>
+          <a:chExt cx="0" cy="0"/>
+        </a:xfrm>
+      </p:grpSpPr>
+      <p:sp>
+        <p:nvSpPr>
+          <p:cNvPr id="2" name="Title 1">
+            <a:extLst>
+              <a:ext uri="{FF2B5EF4-FFF2-40B4-BE49-F238E27FC236}">
+                <a16:creationId xmlns:a16="http://schemas.microsoft.com/office/drawing/2014/main" id="{ACFEDB95-8344-504B-87A6-DC97B9098CA9}"/>
+              </a:ext>
+            </a:extLst>
+          </p:cNvPr>
+          <p:cNvSpPr>
+            <a:spLocks noGrp="1"/>
+          </p:cNvSpPr>
+          <p:nvPr>
+            <p:ph type="title"/>
+          </p:nvPr>
+        </p:nvSpPr>
+        <p:spPr/>
+        <p:txBody>
+          <a:bodyPr/>
+          <a:lstStyle/>
+          <a:p>
+            <a:pPr algn="ctr"/>
+            <a:r>
+              <a:rPr lang="en-US" b="1" dirty="0"/>
+              <a:t>Solution</a:t>
+            </a:r>
+          </a:p>
+        </p:txBody>
+      </p:sp>
+      <p:sp>
+        <p:nvSpPr>
+          <p:cNvPr id="8" name="Content Placeholder 7">
+            <a:extLst>
+              <a:ext uri="{FF2B5EF4-FFF2-40B4-BE49-F238E27FC236}">
+                <a16:creationId xmlns:a16="http://schemas.microsoft.com/office/drawing/2014/main" id="{E09166C2-8D2F-4F46-A6CB-2A47DCCF99FC}"/>
+              </a:ext>
+            </a:extLst>
+          </p:cNvPr>
+          <p:cNvSpPr>
+            <a:spLocks noGrp="1"/>
+          </p:cNvSpPr>
+          <p:nvPr>
+            <p:ph idx="1"/>
+          </p:nvPr>
+        </p:nvSpPr>
+        <p:spPr>
+          <a:xfrm>
+            <a:off x="1141412" y="2249487"/>
+            <a:ext cx="10380028" cy="2825433"/>
+          </a:xfrm>
+        </p:spPr>
+        <p:txBody>
+          <a:bodyPr/>
+          <a:lstStyle/>
+          <a:p>
+            <a:r>
+              <a:rPr lang="en-US" dirty="0"/>
+              <a:t>Your solution can look something like this:</a:t>
+            </a:r>
+          </a:p>
+          <a:p>
+            <a:endParaRPr lang="en-US" dirty="0"/>
+          </a:p>
+          <a:p>
+            <a:endParaRPr lang="en-US" dirty="0"/>
+          </a:p>
+          <a:p>
+            <a:r>
+              <a:rPr lang="en-US" dirty="0"/>
+              <a:t>We return </a:t>
+            </a:r>
+            <a:r>
+              <a:rPr lang="en-US" sz="2000" dirty="0">
+                <a:latin typeface="Consolas" panose="020B0609020204030204" pitchFamily="49" charset="0"/>
+                <a:cs typeface="Consolas" panose="020B0609020204030204" pitchFamily="49" charset="0"/>
+              </a:rPr>
+              <a:t>!</a:t>
+            </a:r>
+            <a:r>
+              <a:rPr lang="en-US" sz="2000" dirty="0" err="1">
+                <a:solidFill>
+                  <a:schemeClr val="accent6"/>
+                </a:solidFill>
+                <a:latin typeface="Consolas" panose="020B0609020204030204" pitchFamily="49" charset="0"/>
+                <a:cs typeface="Consolas" panose="020B0609020204030204" pitchFamily="49" charset="0"/>
+              </a:rPr>
+              <a:t>isalpha</a:t>
+            </a:r>
+            <a:r>
+              <a:rPr lang="en-US" sz="2000" dirty="0">
+                <a:latin typeface="Consolas" panose="020B0609020204030204" pitchFamily="49" charset="0"/>
+                <a:cs typeface="Consolas" panose="020B0609020204030204" pitchFamily="49" charset="0"/>
+              </a:rPr>
+              <a:t>(c)</a:t>
+            </a:r>
+            <a:r>
+              <a:rPr lang="en-US" dirty="0"/>
+              <a:t> because “If </a:t>
+            </a:r>
+            <a:r>
+              <a:rPr lang="en-US" dirty="0">
+                <a:latin typeface="Consolas" panose="020B0609020204030204" pitchFamily="49" charset="0"/>
+                <a:cs typeface="Consolas" panose="020B0609020204030204" pitchFamily="49" charset="0"/>
+              </a:rPr>
+              <a:t>c</a:t>
+            </a:r>
+            <a:r>
+              <a:rPr lang="en-US" dirty="0"/>
+              <a:t> IS alphanumeric, then it is NOT ILLEGAL”</a:t>
+            </a:r>
+          </a:p>
+        </p:txBody>
+      </p:sp>
+      <p:pic>
+        <p:nvPicPr>
+          <p:cNvPr id="10" name="Graphic 9" descr="Robber">
+            <a:extLst>
+              <a:ext uri="{FF2B5EF4-FFF2-40B4-BE49-F238E27FC236}">
+                <a16:creationId xmlns:a16="http://schemas.microsoft.com/office/drawing/2014/main" id="{D5FBF5F7-C13D-BB49-8AF3-25281E8B54DC}"/>
+              </a:ext>
+            </a:extLst>
+          </p:cNvPr>
+          <p:cNvPicPr>
+            <a:picLocks noChangeAspect="1"/>
+          </p:cNvPicPr>
+          <p:nvPr/>
+        </p:nvPicPr>
+        <p:blipFill>
+          <a:blip r:embed="rId2">
+            <a:extLst>
+              <a:ext uri="{96DAC541-7B7A-43D3-8B79-37D633B846F1}">
+                <asvg:svgBlip xmlns:asvg="http://schemas.microsoft.com/office/drawing/2016/SVG/main" r:embed="rId3"/>
+              </a:ext>
+            </a:extLst>
+          </a:blip>
+          <a:stretch>
+            <a:fillRect/>
+          </a:stretch>
+        </p:blipFill>
+        <p:spPr>
+          <a:xfrm>
+            <a:off x="546257" y="5704493"/>
+            <a:ext cx="1190309" cy="1190309"/>
+          </a:xfrm>
+          <a:prstGeom prst="rect">
+            <a:avLst/>
+          </a:prstGeom>
+        </p:spPr>
+      </p:pic>
+      <p:pic>
+        <p:nvPicPr>
+          <p:cNvPr id="12" name="Picture 11">
+            <a:extLst>
+              <a:ext uri="{FF2B5EF4-FFF2-40B4-BE49-F238E27FC236}">
+                <a16:creationId xmlns:a16="http://schemas.microsoft.com/office/drawing/2014/main" id="{C6F39955-F23D-924F-B110-7EA2A7F83C49}"/>
+              </a:ext>
+            </a:extLst>
+          </p:cNvPr>
+          <p:cNvPicPr>
+            <a:picLocks noChangeAspect="1"/>
+          </p:cNvPicPr>
+          <p:nvPr/>
+        </p:nvPicPr>
+        <p:blipFill>
+          <a:blip r:embed="rId4"/>
+          <a:stretch>
+            <a:fillRect/>
+          </a:stretch>
+        </p:blipFill>
+        <p:spPr>
+          <a:xfrm>
+            <a:off x="6814820" y="2386647"/>
+            <a:ext cx="3807460" cy="1292441"/>
+          </a:xfrm>
+          <a:prstGeom prst="rect">
+            <a:avLst/>
+          </a:prstGeom>
+        </p:spPr>
+      </p:pic>
+      <p:pic>
+        <p:nvPicPr>
+          <p:cNvPr id="9" name="Content Placeholder 4" descr="Jail">
+            <a:extLst>
+              <a:ext uri="{FF2B5EF4-FFF2-40B4-BE49-F238E27FC236}">
+                <a16:creationId xmlns:a16="http://schemas.microsoft.com/office/drawing/2014/main" id="{90D697BA-2FDE-DC4E-90F1-1153996E5EF5}"/>
+              </a:ext>
+            </a:extLst>
+          </p:cNvPr>
+          <p:cNvPicPr>
+            <a:picLocks noChangeAspect="1"/>
+          </p:cNvPicPr>
+          <p:nvPr/>
+        </p:nvPicPr>
+        <p:blipFill>
+          <a:blip r:embed="rId5">
+            <a:extLst>
+              <a:ext uri="{96DAC541-7B7A-43D3-8B79-37D633B846F1}">
+                <asvg:svgBlip xmlns:asvg="http://schemas.microsoft.com/office/drawing/2016/SVG/main" r:embed="rId6"/>
+              </a:ext>
+            </a:extLst>
+          </a:blip>
+          <a:stretch>
+            <a:fillRect/>
+          </a:stretch>
+        </p:blipFill>
+        <p:spPr>
+          <a:xfrm>
+            <a:off x="6451600" y="4646753"/>
+            <a:ext cx="2783840" cy="2783840"/>
+          </a:xfrm>
+          <a:prstGeom prst="rect">
+            <a:avLst/>
+          </a:prstGeom>
+        </p:spPr>
+      </p:pic>
+    </p:spTree>
+    <p:extLst>
+      <p:ext uri="{BB962C8B-B14F-4D97-AF65-F5344CB8AC3E}">
+        <p14:creationId xmlns:p14="http://schemas.microsoft.com/office/powerpoint/2010/main" val="1141031998"/>
+      </p:ext>
+    </p:extLst>
+  </p:cSld>
+  <p:clrMapOvr>
+    <a:masterClrMapping/>
+  </p:clrMapOvr>
+  <p:timing>
+    <p:tnLst>
+      <p:par>
+        <p:cTn id="1" dur="indefinite" restart="never" nodeType="tmRoot">
+          <p:childTnLst>
+            <p:seq concurrent="1" nextAc="seek">
+              <p:cTn id="2" dur="indefinite" nodeType="mainSeq">
+                <p:childTnLst>
+                  <p:par>
+                    <p:cTn id="3" fill="hold">
+                      <p:stCondLst>
+                        <p:cond delay="indefinite"/>
+                      </p:stCondLst>
+                      <p:childTnLst>
+                        <p:par>
+                          <p:cTn id="4" fill="hold">
+                            <p:stCondLst>
+                              <p:cond delay="0"/>
+                            </p:stCondLst>
+                            <p:childTnLst>
+                              <p:par>
+                                <p:cTn id="5" presetID="2" presetClass="entr" presetSubtype="4" fill="hold" grpId="0" nodeType="clickEffect">
+                                  <p:stCondLst>
+                                    <p:cond delay="0"/>
+                                  </p:stCondLst>
+                                  <p:childTnLst>
+                                    <p:set>
+                                      <p:cBhvr>
+                                        <p:cTn id="6" dur="1" fill="hold">
+                                          <p:stCondLst>
+                                            <p:cond delay="0"/>
+                                          </p:stCondLst>
+                                        </p:cTn>
+                                        <p:tgtEl>
+                                          <p:spTgt spid="8">
+                                            <p:txEl>
+                                              <p:pRg st="0" end="0"/>
+                                            </p:txEl>
+                                          </p:spTgt>
+                                        </p:tgtEl>
+                                        <p:attrNameLst>
+                                          <p:attrName>style.visibility</p:attrName>
+                                        </p:attrNameLst>
+                                      </p:cBhvr>
+                                      <p:to>
+                                        <p:strVal val="visible"/>
+                                      </p:to>
+                                    </p:set>
+                                    <p:anim calcmode="lin" valueType="num">
+                                      <p:cBhvr additive="base">
+                                        <p:cTn id="7" dur="500" fill="hold"/>
+                                        <p:tgtEl>
+                                          <p:spTgt spid="8">
+                                            <p:txEl>
+                                              <p:pRg st="0" end="0"/>
+                                            </p:txEl>
+                                          </p:spTgt>
+                                        </p:tgtEl>
+                                        <p:attrNameLst>
+                                          <p:attrName>ppt_x</p:attrName>
+                                        </p:attrNameLst>
+                                      </p:cBhvr>
+                                      <p:tavLst>
+                                        <p:tav tm="0">
+                                          <p:val>
+                                            <p:strVal val="#ppt_x"/>
+                                          </p:val>
+                                        </p:tav>
+                                        <p:tav tm="100000">
+                                          <p:val>
+                                            <p:strVal val="#ppt_x"/>
+                                          </p:val>
+                                        </p:tav>
+                                      </p:tavLst>
+                                    </p:anim>
+                                    <p:anim calcmode="lin" valueType="num">
+                                      <p:cBhvr additive="base">
+                                        <p:cTn id="8" dur="500" fill="hold"/>
+                                        <p:tgtEl>
+                                          <p:spTgt spid="8">
+                                            <p:txEl>
+                                              <p:pRg st="0" end="0"/>
+                                            </p:txEl>
+                                          </p:spTgt>
+                                        </p:tgtEl>
+                                        <p:attrNameLst>
+                                          <p:attrName>ppt_y</p:attrName>
+                                        </p:attrNameLst>
+                                      </p:cBhvr>
+                                      <p:tavLst>
+                                        <p:tav tm="0">
+                                          <p:val>
+                                            <p:strVal val="1+#ppt_h/2"/>
+                                          </p:val>
+                                        </p:tav>
+                                        <p:tav tm="100000">
+                                          <p:val>
+                                            <p:strVal val="#ppt_y"/>
+                                          </p:val>
+                                        </p:tav>
+                                      </p:tavLst>
+                                    </p:anim>
+                                  </p:childTnLst>
+                                </p:cTn>
+                              </p:par>
+                              <p:par>
+                                <p:cTn id="9" presetID="2" presetClass="entr" presetSubtype="2" fill="hold" nodeType="withEffect">
+                                  <p:stCondLst>
+                                    <p:cond delay="0"/>
+                                  </p:stCondLst>
+                                  <p:childTnLst>
+                                    <p:set>
+                                      <p:cBhvr>
+                                        <p:cTn id="10" dur="1" fill="hold">
+                                          <p:stCondLst>
+                                            <p:cond delay="0"/>
+                                          </p:stCondLst>
+                                        </p:cTn>
+                                        <p:tgtEl>
+                                          <p:spTgt spid="12"/>
+                                        </p:tgtEl>
+                                        <p:attrNameLst>
+                                          <p:attrName>style.visibility</p:attrName>
+                                        </p:attrNameLst>
+                                      </p:cBhvr>
+                                      <p:to>
+                                        <p:strVal val="visible"/>
+                                      </p:to>
+                                    </p:set>
+                                    <p:anim calcmode="lin" valueType="num">
+                                      <p:cBhvr additive="base">
+                                        <p:cTn id="11" dur="500" fill="hold"/>
+                                        <p:tgtEl>
+                                          <p:spTgt spid="12"/>
+                                        </p:tgtEl>
+                                        <p:attrNameLst>
+                                          <p:attrName>ppt_x</p:attrName>
+                                        </p:attrNameLst>
+                                      </p:cBhvr>
+                                      <p:tavLst>
+                                        <p:tav tm="0">
+                                          <p:val>
+                                            <p:strVal val="1+#ppt_w/2"/>
+                                          </p:val>
+                                        </p:tav>
+                                        <p:tav tm="100000">
+                                          <p:val>
+                                            <p:strVal val="#ppt_x"/>
+                                          </p:val>
+                                        </p:tav>
+                                      </p:tavLst>
+                                    </p:anim>
+                                    <p:anim calcmode="lin" valueType="num">
+                                      <p:cBhvr additive="base">
+                                        <p:cTn id="12" dur="500" fill="hold"/>
+                                        <p:tgtEl>
+                                          <p:spTgt spid="12"/>
+                                        </p:tgtEl>
+                                        <p:attrNameLst>
+                                          <p:attrName>ppt_y</p:attrName>
+                                        </p:attrNameLst>
+                                      </p:cBhvr>
+                                      <p:tavLst>
+                                        <p:tav tm="0">
+                                          <p:val>
+                                            <p:strVal val="#ppt_y"/>
+                                          </p:val>
+                                        </p:tav>
+                                        <p:tav tm="100000">
+                                          <p:val>
+                                            <p:strVal val="#ppt_y"/>
+                                          </p:val>
+                                        </p:tav>
+                                      </p:tavLst>
+                                    </p:anim>
+                                  </p:childTnLst>
+                                </p:cTn>
+                              </p:par>
+                            </p:childTnLst>
+                          </p:cTn>
+                        </p:par>
+                      </p:childTnLst>
+                    </p:cTn>
+                  </p:par>
+                  <p:par>
+                    <p:cTn id="13" fill="hold">
+                      <p:stCondLst>
+                        <p:cond delay="indefinite"/>
+                      </p:stCondLst>
+                      <p:childTnLst>
+                        <p:par>
+                          <p:cTn id="14" fill="hold">
+                            <p:stCondLst>
+                              <p:cond delay="0"/>
+                            </p:stCondLst>
+                            <p:childTnLst>
+                              <p:par>
+                                <p:cTn id="15" presetID="2" presetClass="entr" presetSubtype="4" fill="hold" grpId="0" nodeType="clickEffect">
+                                  <p:stCondLst>
+                                    <p:cond delay="0"/>
+                                  </p:stCondLst>
+                                  <p:childTnLst>
+                                    <p:set>
+                                      <p:cBhvr>
+                                        <p:cTn id="16" dur="1" fill="hold">
+                                          <p:stCondLst>
+                                            <p:cond delay="0"/>
+                                          </p:stCondLst>
+                                        </p:cTn>
+                                        <p:tgtEl>
+                                          <p:spTgt spid="8">
+                                            <p:txEl>
+                                              <p:pRg st="3" end="3"/>
+                                            </p:txEl>
+                                          </p:spTgt>
+                                        </p:tgtEl>
+                                        <p:attrNameLst>
+                                          <p:attrName>style.visibility</p:attrName>
+                                        </p:attrNameLst>
+                                      </p:cBhvr>
+                                      <p:to>
+                                        <p:strVal val="visible"/>
+                                      </p:to>
+                                    </p:set>
+                                    <p:anim calcmode="lin" valueType="num">
+                                      <p:cBhvr additive="base">
+                                        <p:cTn id="17" dur="500" fill="hold"/>
+                                        <p:tgtEl>
+                                          <p:spTgt spid="8">
+                                            <p:txEl>
+                                              <p:pRg st="3" end="3"/>
+                                            </p:txEl>
+                                          </p:spTgt>
+                                        </p:tgtEl>
+                                        <p:attrNameLst>
+                                          <p:attrName>ppt_x</p:attrName>
+                                        </p:attrNameLst>
+                                      </p:cBhvr>
+                                      <p:tavLst>
+                                        <p:tav tm="0">
+                                          <p:val>
+                                            <p:strVal val="#ppt_x"/>
+                                          </p:val>
+                                        </p:tav>
+                                        <p:tav tm="100000">
+                                          <p:val>
+                                            <p:strVal val="#ppt_x"/>
+                                          </p:val>
+                                        </p:tav>
+                                      </p:tavLst>
+                                    </p:anim>
+                                    <p:anim calcmode="lin" valueType="num">
+                                      <p:cBhvr additive="base">
+                                        <p:cTn id="18" dur="500" fill="hold"/>
+                                        <p:tgtEl>
+                                          <p:spTgt spid="8">
+                                            <p:txEl>
+                                              <p:pRg st="3" end="3"/>
+                                            </p:txEl>
+                                          </p:spTgt>
+                                        </p:tgtEl>
+                                        <p:attrNameLst>
+                                          <p:attrName>ppt_y</p:attrName>
+                                        </p:attrNameLst>
+                                      </p:cBhvr>
+                                      <p:tavLst>
+                                        <p:tav tm="0">
+                                          <p:val>
+                                            <p:strVal val="1+#ppt_h/2"/>
+                                          </p:val>
+                                        </p:tav>
+                                        <p:tav tm="100000">
+                                          <p:val>
+                                            <p:strVal val="#ppt_y"/>
+                                          </p:val>
+                                        </p:tav>
+                                      </p:tavLst>
+                                    </p:anim>
+                                  </p:childTnLst>
+                                </p:cTn>
+                              </p:par>
+                              <p:par>
+                                <p:cTn id="19" presetID="2" presetClass="entr" presetSubtype="4" fill="hold" nodeType="withEffect">
+                                  <p:stCondLst>
+                                    <p:cond delay="0"/>
+                                  </p:stCondLst>
+                                  <p:childTnLst>
+                                    <p:set>
+                                      <p:cBhvr>
+                                        <p:cTn id="20" dur="1" fill="hold">
+                                          <p:stCondLst>
+                                            <p:cond delay="0"/>
+                                          </p:stCondLst>
+                                        </p:cTn>
+                                        <p:tgtEl>
+                                          <p:spTgt spid="10"/>
+                                        </p:tgtEl>
+                                        <p:attrNameLst>
+                                          <p:attrName>style.visibility</p:attrName>
+                                        </p:attrNameLst>
+                                      </p:cBhvr>
+                                      <p:to>
+                                        <p:strVal val="visible"/>
+                                      </p:to>
+                                    </p:set>
+                                    <p:anim calcmode="lin" valueType="num">
+                                      <p:cBhvr additive="base">
+                                        <p:cTn id="21" dur="500" fill="hold"/>
+                                        <p:tgtEl>
+                                          <p:spTgt spid="10"/>
+                                        </p:tgtEl>
+                                        <p:attrNameLst>
+                                          <p:attrName>ppt_x</p:attrName>
+                                        </p:attrNameLst>
+                                      </p:cBhvr>
+                                      <p:tavLst>
+                                        <p:tav tm="0">
+                                          <p:val>
+                                            <p:strVal val="#ppt_x"/>
+                                          </p:val>
+                                        </p:tav>
+                                        <p:tav tm="100000">
+                                          <p:val>
+                                            <p:strVal val="#ppt_x"/>
+                                          </p:val>
+                                        </p:tav>
+                                      </p:tavLst>
+                                    </p:anim>
+                                    <p:anim calcmode="lin" valueType="num">
+                                      <p:cBhvr additive="base">
+                                        <p:cTn id="22" dur="500" fill="hold"/>
+                                        <p:tgtEl>
+                                          <p:spTgt spid="10"/>
+                                        </p:tgtEl>
+                                        <p:attrNameLst>
+                                          <p:attrName>ppt_y</p:attrName>
+                                        </p:attrNameLst>
+                                      </p:cBhvr>
+                                      <p:tavLst>
+                                        <p:tav tm="0">
+                                          <p:val>
+                                            <p:strVal val="1+#ppt_h/2"/>
+                                          </p:val>
+                                        </p:tav>
+                                        <p:tav tm="100000">
+                                          <p:val>
+                                            <p:strVal val="#ppt_y"/>
+                                          </p:val>
+                                        </p:tav>
+                                      </p:tavLst>
+                                    </p:anim>
+                                  </p:childTnLst>
+                                </p:cTn>
+                              </p:par>
+                              <p:par>
+                                <p:cTn id="23" presetID="0" presetClass="path" presetSubtype="0" accel="50000" decel="50000" fill="hold" nodeType="withEffect">
+                                  <p:stCondLst>
+                                    <p:cond delay="0"/>
+                                  </p:stCondLst>
+                                  <p:childTnLst>
+                                    <p:animMotion origin="layout" path="M 2.08333E-7 -0.00579 L 0.55143 -0.0088 " pathEditMode="relative" rAng="0" ptsTypes="AA">
+                                      <p:cBhvr>
+                                        <p:cTn id="24" dur="2000" fill="hold"/>
+                                        <p:tgtEl>
+                                          <p:spTgt spid="10"/>
+                                        </p:tgtEl>
+                                        <p:attrNameLst>
+                                          <p:attrName>ppt_x</p:attrName>
+                                          <p:attrName>ppt_y</p:attrName>
+                                        </p:attrNameLst>
+                                      </p:cBhvr>
+                                      <p:rCtr x="27565" y="-162"/>
+                                    </p:animMotion>
+                                  </p:childTnLst>
+                                </p:cTn>
+                              </p:par>
+                              <p:par>
+                                <p:cTn id="25" presetID="3" presetClass="entr" presetSubtype="10" fill="hold" nodeType="withEffect">
+                                  <p:stCondLst>
+                                    <p:cond delay="0"/>
+                                  </p:stCondLst>
+                                  <p:childTnLst>
+                                    <p:set>
+                                      <p:cBhvr>
+                                        <p:cTn id="26" dur="1" fill="hold">
+                                          <p:stCondLst>
+                                            <p:cond delay="0"/>
+                                          </p:stCondLst>
+                                        </p:cTn>
+                                        <p:tgtEl>
+                                          <p:spTgt spid="9"/>
+                                        </p:tgtEl>
+                                        <p:attrNameLst>
+                                          <p:attrName>style.visibility</p:attrName>
+                                        </p:attrNameLst>
+                                      </p:cBhvr>
+                                      <p:to>
+                                        <p:strVal val="visible"/>
+                                      </p:to>
+                                    </p:set>
+                                    <p:animEffect transition="in" filter="blinds(horizontal)">
+                                      <p:cBhvr>
+                                        <p:cTn id="27" dur="500"/>
+                                        <p:tgtEl>
+                                          <p:spTgt spid="9"/>
+                                        </p:tgtEl>
+                                      </p:cBhvr>
+                                    </p:animEffect>
+                                  </p:childTnLst>
+                                </p:cTn>
+                              </p:par>
+                            </p:childTnLst>
+                          </p:cTn>
+                        </p:par>
+                      </p:childTnLst>
+                    </p:cTn>
+                  </p:par>
+                </p:childTnLst>
+              </p:cTn>
+              <p:prevCondLst>
+                <p:cond evt="onPrev" delay="0">
+                  <p:tgtEl>
+                    <p:sldTgt/>
+                  </p:tgtEl>
+                </p:cond>
+              </p:prevCondLst>
+              <p:nextCondLst>
+                <p:cond evt="onNext" delay="0">
+                  <p:tgtEl>
+                    <p:sldTgt/>
+                  </p:tgtEl>
+                </p:cond>
+              </p:nextCondLst>
+            </p:seq>
+          </p:childTnLst>
+        </p:cTn>
+      </p:par>
+    </p:tnLst>
+    <p:bldLst>
+      <p:bldP spid="8" grpId="0" uiExpand="1" build="p"/>
+    </p:bldLst>
+  </p:timing>
+</p:sld>
+</file>
+
+<file path=ppt/slides/slide29.xml><?xml version="1.0" encoding="utf-8"?>
+<p:sld xmlns:a="http://schemas.openxmlformats.org/drawingml/2006/main" xmlns:r="http://schemas.openxmlformats.org/officeDocument/2006/relationships" xmlns:p="http://schemas.openxmlformats.org/presentationml/2006/main">
+  <p:cSld>
+    <p:spTree>
+      <p:nvGrpSpPr>
+        <p:cNvPr id="1" name=""/>
+        <p:cNvGrpSpPr/>
+        <p:nvPr/>
+      </p:nvGrpSpPr>
+      <p:grpSpPr>
+        <a:xfrm>
+          <a:off x="0" y="0"/>
+          <a:ext cx="0" cy="0"/>
+          <a:chOff x="0" y="0"/>
+          <a:chExt cx="0" cy="0"/>
+        </a:xfrm>
+      </p:grpSpPr>
+      <p:sp>
+        <p:nvSpPr>
+          <p:cNvPr id="2" name="Title 1">
+            <a:extLst>
+              <a:ext uri="{FF2B5EF4-FFF2-40B4-BE49-F238E27FC236}">
+                <a16:creationId xmlns:a16="http://schemas.microsoft.com/office/drawing/2014/main" id="{6ED235B4-2652-C34D-AD86-7F3E7B24E761}"/>
+              </a:ext>
+            </a:extLst>
+          </p:cNvPr>
+          <p:cNvSpPr>
+            <a:spLocks noGrp="1"/>
+          </p:cNvSpPr>
+          <p:nvPr>
+            <p:ph type="title"/>
+          </p:nvPr>
+        </p:nvSpPr>
+        <p:spPr/>
+        <p:txBody>
+          <a:bodyPr/>
+          <a:lstStyle/>
+          <a:p>
+            <a:pPr algn="ctr"/>
+            <a:r>
+              <a:rPr lang="en-US" b="1" dirty="0"/>
+              <a:t>Stopping illegal strings</a:t>
+            </a:r>
+          </a:p>
+        </p:txBody>
+      </p:sp>
+      <p:sp>
+        <p:nvSpPr>
+          <p:cNvPr id="3" name="Content Placeholder 2">
+            <a:extLst>
+              <a:ext uri="{FF2B5EF4-FFF2-40B4-BE49-F238E27FC236}">
+                <a16:creationId xmlns:a16="http://schemas.microsoft.com/office/drawing/2014/main" id="{040D44BF-A40D-FE42-993F-769BC57D5AF9}"/>
+              </a:ext>
+            </a:extLst>
+          </p:cNvPr>
+          <p:cNvSpPr>
+            <a:spLocks noGrp="1"/>
+          </p:cNvSpPr>
+          <p:nvPr>
+            <p:ph idx="1"/>
+          </p:nvPr>
+        </p:nvSpPr>
+        <p:spPr>
+          <a:xfrm>
+            <a:off x="1141412" y="2249486"/>
+            <a:ext cx="9905999" cy="3989995"/>
+          </a:xfrm>
+        </p:spPr>
+        <p:txBody>
+          <a:bodyPr>
+            <a:normAutofit fontScale="92500" lnSpcReduction="10000"/>
+          </a:bodyPr>
+          <a:lstStyle/>
+          <a:p>
+            <a:r>
+              <a:rPr lang="en-US" dirty="0"/>
+              <a:t>Before we stopped our user from inputting a SINGLE number into our program</a:t>
+            </a:r>
+          </a:p>
+          <a:p>
+            <a:pPr lvl="1"/>
+            <a:r>
+              <a:rPr lang="en-US">
+                <a:solidFill>
+                  <a:srgbClr val="00B100"/>
+                </a:solidFill>
+                <a:highlight>
+                  <a:srgbClr val="000000"/>
+                </a:highlight>
+                <a:latin typeface="Consolas" panose="020B0609020204030204" pitchFamily="49" charset="0"/>
+                <a:cs typeface="Consolas" panose="020B0609020204030204" pitchFamily="49" charset="0"/>
+              </a:rPr>
+              <a:t>:~ ./a</a:t>
+            </a:r>
+            <a:r>
+              <a:rPr lang="en-US" dirty="0" err="1">
+                <a:solidFill>
+                  <a:srgbClr val="00B100"/>
+                </a:solidFill>
+                <a:highlight>
+                  <a:srgbClr val="000000"/>
+                </a:highlight>
+                <a:latin typeface="Consolas" panose="020B0609020204030204" pitchFamily="49" charset="0"/>
+                <a:cs typeface="Consolas" panose="020B0609020204030204" pitchFamily="49" charset="0"/>
+              </a:rPr>
+              <a:t>.out</a:t>
+            </a:r>
+            <a:r>
+              <a:rPr lang="en-US" dirty="0">
+                <a:solidFill>
+                  <a:srgbClr val="00B100"/>
+                </a:solidFill>
+                <a:highlight>
+                  <a:srgbClr val="000000"/>
+                </a:highlight>
+                <a:latin typeface="Consolas" panose="020B0609020204030204" pitchFamily="49" charset="0"/>
+                <a:cs typeface="Consolas" panose="020B0609020204030204" pitchFamily="49" charset="0"/>
+              </a:rPr>
+              <a:t> 12</a:t>
+            </a:r>
+            <a:r>
+              <a:rPr lang="en-US" dirty="0"/>
+              <a:t> would be rejected</a:t>
+            </a:r>
+          </a:p>
+          <a:p>
+            <a:endParaRPr lang="en-US" dirty="0"/>
+          </a:p>
+          <a:p>
+            <a:r>
+              <a:rPr lang="en-US" dirty="0"/>
+              <a:t>But what if we entered something like “iAmN07Astr1ng”?</a:t>
+            </a:r>
+          </a:p>
+          <a:p>
+            <a:pPr lvl="1"/>
+            <a:r>
+              <a:rPr lang="en-US" dirty="0"/>
+              <a:t>In short, our program would go “Well this whole thing is not a number, so that’s fine”</a:t>
+            </a:r>
+          </a:p>
+          <a:p>
+            <a:pPr lvl="1"/>
+            <a:r>
+              <a:rPr lang="en-US" dirty="0"/>
+              <a:t>Unfortunately this is the furthest that we can get from “fine” (</a:t>
+            </a:r>
+            <a:r>
+              <a:rPr lang="en-US" dirty="0" err="1"/>
+              <a:t>ie</a:t>
+            </a:r>
+            <a:r>
+              <a:rPr lang="en-US" dirty="0"/>
+              <a:t>. It’s a disaster!)</a:t>
+            </a:r>
+          </a:p>
+          <a:p>
+            <a:pPr lvl="1"/>
+            <a:endParaRPr lang="en-US" dirty="0"/>
+          </a:p>
+          <a:p>
+            <a:r>
+              <a:rPr lang="en-US" dirty="0"/>
+              <a:t>So what’s the problem?</a:t>
+            </a:r>
+          </a:p>
+          <a:p>
+            <a:pPr lvl="1"/>
+            <a:r>
+              <a:rPr lang="en-US" b="1" dirty="0"/>
+              <a:t>Simply</a:t>
+            </a:r>
+            <a:r>
+              <a:rPr lang="en-US" dirty="0"/>
+              <a:t>: We are not checking the entire string for illegal characters</a:t>
+            </a:r>
+          </a:p>
+        </p:txBody>
+      </p:sp>
+      <p:pic>
+        <p:nvPicPr>
+          <p:cNvPr id="5" name="Graphic 4" descr="Warning">
+            <a:extLst>
+              <a:ext uri="{FF2B5EF4-FFF2-40B4-BE49-F238E27FC236}">
+                <a16:creationId xmlns:a16="http://schemas.microsoft.com/office/drawing/2014/main" id="{268A3D77-0928-3444-A280-62BE4217F6C0}"/>
+              </a:ext>
+            </a:extLst>
+          </p:cNvPr>
+          <p:cNvPicPr>
+            <a:picLocks noChangeAspect="1"/>
+          </p:cNvPicPr>
+          <p:nvPr/>
+        </p:nvPicPr>
+        <p:blipFill>
+          <a:blip r:embed="rId2">
+            <a:extLst>
+              <a:ext uri="{96DAC541-7B7A-43D3-8B79-37D633B846F1}">
+                <asvg:svgBlip xmlns:asvg="http://schemas.microsoft.com/office/drawing/2016/SVG/main" r:embed="rId3"/>
+              </a:ext>
+            </a:extLst>
+          </a:blip>
+          <a:stretch>
+            <a:fillRect/>
+          </a:stretch>
+        </p:blipFill>
+        <p:spPr>
+          <a:xfrm>
+            <a:off x="9098280" y="771208"/>
+            <a:ext cx="914400" cy="914400"/>
+          </a:xfrm>
+          <a:prstGeom prst="rect">
+            <a:avLst/>
+          </a:prstGeom>
+        </p:spPr>
+      </p:pic>
+    </p:spTree>
+    <p:extLst>
+      <p:ext uri="{BB962C8B-B14F-4D97-AF65-F5344CB8AC3E}">
+        <p14:creationId xmlns:p14="http://schemas.microsoft.com/office/powerpoint/2010/main" val="1999636499"/>
+      </p:ext>
+    </p:extLst>
+  </p:cSld>
+  <p:clrMapOvr>
+    <a:masterClrMapping/>
+  </p:clrMapOvr>
+  <p:timing>
+    <p:tnLst>
+      <p:par>
+        <p:cTn id="1" dur="indefinite" restart="never" nodeType="tmRoot">
+          <p:childTnLst>
+            <p:seq concurrent="1" nextAc="seek">
+              <p:cTn id="2" dur="indefinite" nodeType="mainSeq">
+                <p:childTnLst>
+                  <p:par>
+                    <p:cTn id="3" fill="hold">
+                      <p:stCondLst>
+                        <p:cond delay="indefinite"/>
+                      </p:stCondLst>
+                      <p:childTnLst>
+                        <p:par>
+                          <p:cTn id="4" fill="hold">
+                            <p:stCondLst>
+                              <p:cond delay="0"/>
+                            </p:stCondLst>
+                            <p:childTnLst>
+                              <p:par>
+                                <p:cTn id="5" presetID="2" presetClass="entr" presetSubtype="4" fill="hold" grpId="0" nodeType="clickEffect">
+                                  <p:stCondLst>
+                                    <p:cond delay="0"/>
+                                  </p:stCondLst>
+                                  <p:childTnLst>
+                                    <p:set>
+                                      <p:cBhvr>
+                                        <p:cTn id="6" dur="1" fill="hold">
+                                          <p:stCondLst>
+                                            <p:cond delay="0"/>
+                                          </p:stCondLst>
+                                        </p:cTn>
+                                        <p:tgtEl>
+                                          <p:spTgt spid="3">
+                                            <p:txEl>
+                                              <p:pRg st="0" end="0"/>
+                                            </p:txEl>
+                                          </p:spTgt>
+                                        </p:tgtEl>
+                                        <p:attrNameLst>
+                                          <p:attrName>style.visibility</p:attrName>
+                                        </p:attrNameLst>
+                                      </p:cBhvr>
+                                      <p:to>
+                                        <p:strVal val="visible"/>
+                                      </p:to>
+                                    </p:set>
+                                    <p:anim calcmode="lin" valueType="num">
+                                      <p:cBhvr additive="base">
+                                        <p:cTn id="7" dur="500" fill="hold"/>
+                                        <p:tgtEl>
+                                          <p:spTgt spid="3">
+                                            <p:txEl>
+                                              <p:pRg st="0" end="0"/>
+                                            </p:txEl>
+                                          </p:spTgt>
+                                        </p:tgtEl>
+                                        <p:attrNameLst>
+                                          <p:attrName>ppt_x</p:attrName>
+                                        </p:attrNameLst>
+                                      </p:cBhvr>
+                                      <p:tavLst>
+                                        <p:tav tm="0">
+                                          <p:val>
+                                            <p:strVal val="#ppt_x"/>
+                                          </p:val>
+                                        </p:tav>
+                                        <p:tav tm="100000">
+                                          <p:val>
+                                            <p:strVal val="#ppt_x"/>
+                                          </p:val>
+                                        </p:tav>
+                                      </p:tavLst>
+                                    </p:anim>
+                                    <p:anim calcmode="lin" valueType="num">
+                                      <p:cBhvr additive="base">
+                                        <p:cTn id="8" dur="500" fill="hold"/>
+                                        <p:tgtEl>
+                                          <p:spTgt spid="3">
+                                            <p:txEl>
+                                              <p:pRg st="0" end="0"/>
+                                            </p:txEl>
+                                          </p:spTgt>
+                                        </p:tgtEl>
+                                        <p:attrNameLst>
+                                          <p:attrName>ppt_y</p:attrName>
+                                        </p:attrNameLst>
+                                      </p:cBhvr>
+                                      <p:tavLst>
+                                        <p:tav tm="0">
+                                          <p:val>
+                                            <p:strVal val="1+#ppt_h/2"/>
+                                          </p:val>
+                                        </p:tav>
+                                        <p:tav tm="100000">
+                                          <p:val>
+                                            <p:strVal val="#ppt_y"/>
+                                          </p:val>
+                                        </p:tav>
+                                      </p:tavLst>
+                                    </p:anim>
+                                  </p:childTnLst>
+                                </p:cTn>
+                              </p:par>
+                              <p:par>
+                                <p:cTn id="9" presetID="2" presetClass="entr" presetSubtype="4" fill="hold" grpId="0" nodeType="withEffect">
+                                  <p:stCondLst>
+                                    <p:cond delay="0"/>
+                                  </p:stCondLst>
+                                  <p:childTnLst>
+                                    <p:set>
+                                      <p:cBhvr>
+                                        <p:cTn id="10" dur="1" fill="hold">
+                                          <p:stCondLst>
+                                            <p:cond delay="0"/>
+                                          </p:stCondLst>
+                                        </p:cTn>
+                                        <p:tgtEl>
+                                          <p:spTgt spid="3">
+                                            <p:txEl>
+                                              <p:pRg st="1" end="1"/>
+                                            </p:txEl>
+                                          </p:spTgt>
+                                        </p:tgtEl>
+                                        <p:attrNameLst>
+                                          <p:attrName>style.visibility</p:attrName>
+                                        </p:attrNameLst>
+                                      </p:cBhvr>
+                                      <p:to>
+                                        <p:strVal val="visible"/>
+                                      </p:to>
+                                    </p:set>
+                                    <p:anim calcmode="lin" valueType="num">
+                                      <p:cBhvr additive="base">
+                                        <p:cTn id="11" dur="500" fill="hold"/>
+                                        <p:tgtEl>
+                                          <p:spTgt spid="3">
+                                            <p:txEl>
+                                              <p:pRg st="1" end="1"/>
+                                            </p:txEl>
+                                          </p:spTgt>
+                                        </p:tgtEl>
+                                        <p:attrNameLst>
+                                          <p:attrName>ppt_x</p:attrName>
+                                        </p:attrNameLst>
+                                      </p:cBhvr>
+                                      <p:tavLst>
+                                        <p:tav tm="0">
+                                          <p:val>
+                                            <p:strVal val="#ppt_x"/>
+                                          </p:val>
+                                        </p:tav>
+                                        <p:tav tm="100000">
+                                          <p:val>
+                                            <p:strVal val="#ppt_x"/>
+                                          </p:val>
+                                        </p:tav>
+                                      </p:tavLst>
+                                    </p:anim>
+                                    <p:anim calcmode="lin" valueType="num">
+                                      <p:cBhvr additive="base">
+                                        <p:cTn id="12" dur="500" fill="hold"/>
+                                        <p:tgtEl>
+                                          <p:spTgt spid="3">
+                                            <p:txEl>
+                                              <p:pRg st="1" end="1"/>
+                                            </p:txEl>
+                                          </p:spTgt>
+                                        </p:tgtEl>
+                                        <p:attrNameLst>
+                                          <p:attrName>ppt_y</p:attrName>
+                                        </p:attrNameLst>
+                                      </p:cBhvr>
+                                      <p:tavLst>
+                                        <p:tav tm="0">
+                                          <p:val>
+                                            <p:strVal val="1+#ppt_h/2"/>
+                                          </p:val>
+                                        </p:tav>
+                                        <p:tav tm="100000">
+                                          <p:val>
+                                            <p:strVal val="#ppt_y"/>
+                                          </p:val>
+                                        </p:tav>
+                                      </p:tavLst>
+                                    </p:anim>
+                                  </p:childTnLst>
+                                </p:cTn>
+                              </p:par>
+                            </p:childTnLst>
+                          </p:cTn>
+                        </p:par>
+                      </p:childTnLst>
+                    </p:cTn>
+                  </p:par>
+                  <p:par>
+                    <p:cTn id="13" fill="hold">
+                      <p:stCondLst>
+                        <p:cond delay="indefinite"/>
+                      </p:stCondLst>
+                      <p:childTnLst>
+                        <p:par>
+                          <p:cTn id="14" fill="hold">
+                            <p:stCondLst>
+                              <p:cond delay="0"/>
+                            </p:stCondLst>
+                            <p:childTnLst>
+                              <p:par>
+                                <p:cTn id="15" presetID="2" presetClass="entr" presetSubtype="4" fill="hold" grpId="0" nodeType="clickEffect">
+                                  <p:stCondLst>
+                                    <p:cond delay="0"/>
+                                  </p:stCondLst>
+                                  <p:childTnLst>
+                                    <p:set>
+                                      <p:cBhvr>
+                                        <p:cTn id="16" dur="1" fill="hold">
+                                          <p:stCondLst>
+                                            <p:cond delay="0"/>
+                                          </p:stCondLst>
+                                        </p:cTn>
+                                        <p:tgtEl>
+                                          <p:spTgt spid="3">
+                                            <p:txEl>
+                                              <p:pRg st="3" end="3"/>
+                                            </p:txEl>
+                                          </p:spTgt>
+                                        </p:tgtEl>
+                                        <p:attrNameLst>
+                                          <p:attrName>style.visibility</p:attrName>
+                                        </p:attrNameLst>
+                                      </p:cBhvr>
+                                      <p:to>
+                                        <p:strVal val="visible"/>
+                                      </p:to>
+                                    </p:set>
+                                    <p:anim calcmode="lin" valueType="num">
+                                      <p:cBhvr additive="base">
+                                        <p:cTn id="17" dur="500" fill="hold"/>
+                                        <p:tgtEl>
+                                          <p:spTgt spid="3">
+                                            <p:txEl>
+                                              <p:pRg st="3" end="3"/>
+                                            </p:txEl>
+                                          </p:spTgt>
+                                        </p:tgtEl>
+                                        <p:attrNameLst>
+                                          <p:attrName>ppt_x</p:attrName>
+                                        </p:attrNameLst>
+                                      </p:cBhvr>
+                                      <p:tavLst>
+                                        <p:tav tm="0">
+                                          <p:val>
+                                            <p:strVal val="#ppt_x"/>
+                                          </p:val>
+                                        </p:tav>
+                                        <p:tav tm="100000">
+                                          <p:val>
+                                            <p:strVal val="#ppt_x"/>
+                                          </p:val>
+                                        </p:tav>
+                                      </p:tavLst>
+                                    </p:anim>
+                                    <p:anim calcmode="lin" valueType="num">
+                                      <p:cBhvr additive="base">
+                                        <p:cTn id="18" dur="500" fill="hold"/>
+                                        <p:tgtEl>
+                                          <p:spTgt spid="3">
+                                            <p:txEl>
+                                              <p:pRg st="3" end="3"/>
+                                            </p:txEl>
+                                          </p:spTgt>
+                                        </p:tgtEl>
+                                        <p:attrNameLst>
+                                          <p:attrName>ppt_y</p:attrName>
+                                        </p:attrNameLst>
+                                      </p:cBhvr>
+                                      <p:tavLst>
+                                        <p:tav tm="0">
+                                          <p:val>
+                                            <p:strVal val="1+#ppt_h/2"/>
+                                          </p:val>
+                                        </p:tav>
+                                        <p:tav tm="100000">
+                                          <p:val>
+                                            <p:strVal val="#ppt_y"/>
+                                          </p:val>
+                                        </p:tav>
+                                      </p:tavLst>
+                                    </p:anim>
+                                  </p:childTnLst>
+                                </p:cTn>
+                              </p:par>
+                              <p:par>
+                                <p:cTn id="19" presetID="2" presetClass="entr" presetSubtype="4" fill="hold" grpId="0" nodeType="withEffect">
+                                  <p:stCondLst>
+                                    <p:cond delay="0"/>
+                                  </p:stCondLst>
+                                  <p:childTnLst>
+                                    <p:set>
+                                      <p:cBhvr>
+                                        <p:cTn id="20" dur="1" fill="hold">
+                                          <p:stCondLst>
+                                            <p:cond delay="0"/>
+                                          </p:stCondLst>
+                                        </p:cTn>
+                                        <p:tgtEl>
+                                          <p:spTgt spid="3">
+                                            <p:txEl>
+                                              <p:pRg st="4" end="4"/>
+                                            </p:txEl>
+                                          </p:spTgt>
+                                        </p:tgtEl>
+                                        <p:attrNameLst>
+                                          <p:attrName>style.visibility</p:attrName>
+                                        </p:attrNameLst>
+                                      </p:cBhvr>
+                                      <p:to>
+                                        <p:strVal val="visible"/>
+                                      </p:to>
+                                    </p:set>
+                                    <p:anim calcmode="lin" valueType="num">
+                                      <p:cBhvr additive="base">
+                                        <p:cTn id="21" dur="500" fill="hold"/>
+                                        <p:tgtEl>
+                                          <p:spTgt spid="3">
+                                            <p:txEl>
+                                              <p:pRg st="4" end="4"/>
+                                            </p:txEl>
+                                          </p:spTgt>
+                                        </p:tgtEl>
+                                        <p:attrNameLst>
+                                          <p:attrName>ppt_x</p:attrName>
+                                        </p:attrNameLst>
+                                      </p:cBhvr>
+                                      <p:tavLst>
+                                        <p:tav tm="0">
+                                          <p:val>
+                                            <p:strVal val="#ppt_x"/>
+                                          </p:val>
+                                        </p:tav>
+                                        <p:tav tm="100000">
+                                          <p:val>
+                                            <p:strVal val="#ppt_x"/>
+                                          </p:val>
+                                        </p:tav>
+                                      </p:tavLst>
+                                    </p:anim>
+                                    <p:anim calcmode="lin" valueType="num">
+                                      <p:cBhvr additive="base">
+                                        <p:cTn id="22" dur="500" fill="hold"/>
+                                        <p:tgtEl>
+                                          <p:spTgt spid="3">
+                                            <p:txEl>
+                                              <p:pRg st="4" end="4"/>
+                                            </p:txEl>
+                                          </p:spTgt>
+                                        </p:tgtEl>
+                                        <p:attrNameLst>
+                                          <p:attrName>ppt_y</p:attrName>
+                                        </p:attrNameLst>
+                                      </p:cBhvr>
+                                      <p:tavLst>
+                                        <p:tav tm="0">
+                                          <p:val>
+                                            <p:strVal val="1+#ppt_h/2"/>
+                                          </p:val>
+                                        </p:tav>
+                                        <p:tav tm="100000">
+                                          <p:val>
+                                            <p:strVal val="#ppt_y"/>
+                                          </p:val>
+                                        </p:tav>
+                                      </p:tavLst>
+                                    </p:anim>
+                                  </p:childTnLst>
+                                </p:cTn>
+                              </p:par>
+                              <p:par>
+                                <p:cTn id="23" presetID="2" presetClass="entr" presetSubtype="4" fill="hold" grpId="0" nodeType="withEffect">
+                                  <p:stCondLst>
+                                    <p:cond delay="0"/>
+                                  </p:stCondLst>
+                                  <p:childTnLst>
+                                    <p:set>
+                                      <p:cBhvr>
+                                        <p:cTn id="24" dur="1" fill="hold">
+                                          <p:stCondLst>
+                                            <p:cond delay="0"/>
+                                          </p:stCondLst>
+                                        </p:cTn>
+                                        <p:tgtEl>
+                                          <p:spTgt spid="3">
+                                            <p:txEl>
+                                              <p:pRg st="5" end="5"/>
+                                            </p:txEl>
+                                          </p:spTgt>
+                                        </p:tgtEl>
+                                        <p:attrNameLst>
+                                          <p:attrName>style.visibility</p:attrName>
+                                        </p:attrNameLst>
+                                      </p:cBhvr>
+                                      <p:to>
+                                        <p:strVal val="visible"/>
+                                      </p:to>
+                                    </p:set>
+                                    <p:anim calcmode="lin" valueType="num">
+                                      <p:cBhvr additive="base">
+                                        <p:cTn id="25" dur="500" fill="hold"/>
+                                        <p:tgtEl>
+                                          <p:spTgt spid="3">
+                                            <p:txEl>
+                                              <p:pRg st="5" end="5"/>
+                                            </p:txEl>
+                                          </p:spTgt>
+                                        </p:tgtEl>
+                                        <p:attrNameLst>
+                                          <p:attrName>ppt_x</p:attrName>
+                                        </p:attrNameLst>
+                                      </p:cBhvr>
+                                      <p:tavLst>
+                                        <p:tav tm="0">
+                                          <p:val>
+                                            <p:strVal val="#ppt_x"/>
+                                          </p:val>
+                                        </p:tav>
+                                        <p:tav tm="100000">
+                                          <p:val>
+                                            <p:strVal val="#ppt_x"/>
+                                          </p:val>
+                                        </p:tav>
+                                      </p:tavLst>
+                                    </p:anim>
+                                    <p:anim calcmode="lin" valueType="num">
+                                      <p:cBhvr additive="base">
+                                        <p:cTn id="26" dur="500" fill="hold"/>
+                                        <p:tgtEl>
+                                          <p:spTgt spid="3">
+                                            <p:txEl>
+                                              <p:pRg st="5" end="5"/>
+                                            </p:txEl>
+                                          </p:spTgt>
+                                        </p:tgtEl>
+                                        <p:attrNameLst>
+                                          <p:attrName>ppt_y</p:attrName>
+                                        </p:attrNameLst>
+                                      </p:cBhvr>
+                                      <p:tavLst>
+                                        <p:tav tm="0">
+                                          <p:val>
+                                            <p:strVal val="1+#ppt_h/2"/>
+                                          </p:val>
+                                        </p:tav>
+                                        <p:tav tm="100000">
+                                          <p:val>
+                                            <p:strVal val="#ppt_y"/>
+                                          </p:val>
+                                        </p:tav>
+                                      </p:tavLst>
+                                    </p:anim>
+                                  </p:childTnLst>
+                                </p:cTn>
+                              </p:par>
+                            </p:childTnLst>
+                          </p:cTn>
+                        </p:par>
+                      </p:childTnLst>
+                    </p:cTn>
+                  </p:par>
+                  <p:par>
+                    <p:cTn id="27" fill="hold">
+                      <p:stCondLst>
+                        <p:cond delay="indefinite"/>
+                      </p:stCondLst>
+                      <p:childTnLst>
+                        <p:par>
+                          <p:cTn id="28" fill="hold">
+                            <p:stCondLst>
+                              <p:cond delay="0"/>
+                            </p:stCondLst>
+                            <p:childTnLst>
+                              <p:par>
+                                <p:cTn id="29" presetID="2" presetClass="entr" presetSubtype="4" fill="hold" grpId="0" nodeType="clickEffect">
+                                  <p:stCondLst>
+                                    <p:cond delay="0"/>
+                                  </p:stCondLst>
+                                  <p:childTnLst>
+                                    <p:set>
+                                      <p:cBhvr>
+                                        <p:cTn id="30" dur="1" fill="hold">
+                                          <p:stCondLst>
+                                            <p:cond delay="0"/>
+                                          </p:stCondLst>
+                                        </p:cTn>
+                                        <p:tgtEl>
+                                          <p:spTgt spid="3">
+                                            <p:txEl>
+                                              <p:pRg st="7" end="7"/>
+                                            </p:txEl>
+                                          </p:spTgt>
+                                        </p:tgtEl>
+                                        <p:attrNameLst>
+                                          <p:attrName>style.visibility</p:attrName>
+                                        </p:attrNameLst>
+                                      </p:cBhvr>
+                                      <p:to>
+                                        <p:strVal val="visible"/>
+                                      </p:to>
+                                    </p:set>
+                                    <p:anim calcmode="lin" valueType="num">
+                                      <p:cBhvr additive="base">
+                                        <p:cTn id="31" dur="500" fill="hold"/>
+                                        <p:tgtEl>
+                                          <p:spTgt spid="3">
+                                            <p:txEl>
+                                              <p:pRg st="7" end="7"/>
+                                            </p:txEl>
+                                          </p:spTgt>
+                                        </p:tgtEl>
+                                        <p:attrNameLst>
+                                          <p:attrName>ppt_x</p:attrName>
+                                        </p:attrNameLst>
+                                      </p:cBhvr>
+                                      <p:tavLst>
+                                        <p:tav tm="0">
+                                          <p:val>
+                                            <p:strVal val="#ppt_x"/>
+                                          </p:val>
+                                        </p:tav>
+                                        <p:tav tm="100000">
+                                          <p:val>
+                                            <p:strVal val="#ppt_x"/>
+                                          </p:val>
+                                        </p:tav>
+                                      </p:tavLst>
+                                    </p:anim>
+                                    <p:anim calcmode="lin" valueType="num">
+                                      <p:cBhvr additive="base">
+                                        <p:cTn id="32" dur="500" fill="hold"/>
+                                        <p:tgtEl>
+                                          <p:spTgt spid="3">
+                                            <p:txEl>
+                                              <p:pRg st="7" end="7"/>
+                                            </p:txEl>
+                                          </p:spTgt>
+                                        </p:tgtEl>
+                                        <p:attrNameLst>
+                                          <p:attrName>ppt_y</p:attrName>
+                                        </p:attrNameLst>
+                                      </p:cBhvr>
+                                      <p:tavLst>
+                                        <p:tav tm="0">
+                                          <p:val>
+                                            <p:strVal val="1+#ppt_h/2"/>
+                                          </p:val>
+                                        </p:tav>
+                                        <p:tav tm="100000">
+                                          <p:val>
+                                            <p:strVal val="#ppt_y"/>
+                                          </p:val>
+                                        </p:tav>
+                                      </p:tavLst>
+                                    </p:anim>
+                                  </p:childTnLst>
+                                </p:cTn>
+                              </p:par>
+                              <p:par>
+                                <p:cTn id="33" presetID="2" presetClass="entr" presetSubtype="4" fill="hold" grpId="0" nodeType="withEffect">
+                                  <p:stCondLst>
+                                    <p:cond delay="0"/>
+                                  </p:stCondLst>
+                                  <p:childTnLst>
+                                    <p:set>
+                                      <p:cBhvr>
+                                        <p:cTn id="34" dur="1" fill="hold">
+                                          <p:stCondLst>
+                                            <p:cond delay="0"/>
+                                          </p:stCondLst>
+                                        </p:cTn>
+                                        <p:tgtEl>
+                                          <p:spTgt spid="3">
+                                            <p:txEl>
+                                              <p:pRg st="8" end="8"/>
+                                            </p:txEl>
+                                          </p:spTgt>
+                                        </p:tgtEl>
+                                        <p:attrNameLst>
+                                          <p:attrName>style.visibility</p:attrName>
+                                        </p:attrNameLst>
+                                      </p:cBhvr>
+                                      <p:to>
+                                        <p:strVal val="visible"/>
+                                      </p:to>
+                                    </p:set>
+                                    <p:anim calcmode="lin" valueType="num">
+                                      <p:cBhvr additive="base">
+                                        <p:cTn id="35" dur="500" fill="hold"/>
+                                        <p:tgtEl>
+                                          <p:spTgt spid="3">
+                                            <p:txEl>
+                                              <p:pRg st="8" end="8"/>
+                                            </p:txEl>
+                                          </p:spTgt>
+                                        </p:tgtEl>
+                                        <p:attrNameLst>
+                                          <p:attrName>ppt_x</p:attrName>
+                                        </p:attrNameLst>
+                                      </p:cBhvr>
+                                      <p:tavLst>
+                                        <p:tav tm="0">
+                                          <p:val>
+                                            <p:strVal val="#ppt_x"/>
+                                          </p:val>
+                                        </p:tav>
+                                        <p:tav tm="100000">
+                                          <p:val>
+                                            <p:strVal val="#ppt_x"/>
+                                          </p:val>
+                                        </p:tav>
+                                      </p:tavLst>
+                                    </p:anim>
+                                    <p:anim calcmode="lin" valueType="num">
+                                      <p:cBhvr additive="base">
+                                        <p:cTn id="36" dur="500" fill="hold"/>
+                                        <p:tgtEl>
+                                          <p:spTgt spid="3">
+                                            <p:txEl>
+                                              <p:pRg st="8" end="8"/>
+                                            </p:txEl>
+                                          </p:spTgt>
+                                        </p:tgtEl>
+                                        <p:attrNameLst>
+                                          <p:attrName>ppt_y</p:attrName>
+                                        </p:attrNameLst>
+                                      </p:cBhvr>
+                                      <p:tavLst>
+                                        <p:tav tm="0">
+                                          <p:val>
+                                            <p:strVal val="1+#ppt_h/2"/>
+                                          </p:val>
+                                        </p:tav>
+                                        <p:tav tm="100000">
+                                          <p:val>
+                                            <p:strVal val="#ppt_y"/>
+                                          </p:val>
+                                        </p:tav>
+                                      </p:tavLst>
+                                    </p:anim>
+                                  </p:childTnLst>
+                                </p:cTn>
+                              </p:par>
+                            </p:childTnLst>
+                          </p:cTn>
+                        </p:par>
+                      </p:childTnLst>
+                    </p:cTn>
+                  </p:par>
+                </p:childTnLst>
+              </p:cTn>
+              <p:prevCondLst>
+                <p:cond evt="onPrev" delay="0">
+                  <p:tgtEl>
+                    <p:sldTgt/>
+                  </p:tgtEl>
+                </p:cond>
+              </p:prevCondLst>
+              <p:nextCondLst>
+                <p:cond evt="onNext" delay="0">
+                  <p:tgtEl>
+                    <p:sldTgt/>
+                  </p:tgtEl>
+                </p:cond>
+              </p:nextCondLst>
+            </p:seq>
+          </p:childTnLst>
+        </p:cTn>
+      </p:par>
+    </p:tnLst>
+    <p:bldLst>
+      <p:bldP spid="3" grpId="0" build="p"/>
+    </p:bldLst>
+  </p:timing>
 </p:sld>
 </file>
 

</xml_diff>

<commit_message>
Update Day1 & Day4
</commit_message>
<xml_diff>
--- a/Day_4/Day_4.pptx
+++ b/Day_4/Day_4.pptx
@@ -20095,6 +20095,21 @@
             </a:r>
           </a:p>
           <a:p>
+            <a:r>
+              <a:rPr lang="en-US" b="1" dirty="0"/>
+              <a:t>RECURSION </a:t>
+            </a:r>
+            <a:r>
+              <a:rPr lang="en-US" dirty="0"/>
+              <a:t>(</a:t>
+            </a:r>
+            <a:r>
+              <a:rPr lang="en-US"/>
+              <a:t>The stack)</a:t>
+            </a:r>
+            <a:endParaRPr lang="en-US" dirty="0"/>
+          </a:p>
+          <a:p>
             <a:endParaRPr lang="en-US" dirty="0"/>
           </a:p>
           <a:p>
@@ -29821,15 +29836,7 @@
           <a:p>
             <a:r>
               <a:rPr lang="en-US" dirty="0"/>
-              <a:t>This allows us </a:t>
-            </a:r>
-            <a:r>
-              <a:rPr lang="en-US"/>
-              <a:t>to making </a:t>
-            </a:r>
-            <a:r>
-              <a:rPr lang="en-US" dirty="0"/>
-              <a:t>our code more readable in some cases</a:t>
+              <a:t>This allows us to making our code more readable in some cases</a:t>
             </a:r>
           </a:p>
           <a:p>
@@ -30383,13 +30390,13 @@
         </p:nvSpPr>
         <p:spPr>
           <a:xfrm>
-            <a:off x="1005107" y="2249487"/>
-            <a:ext cx="6613062" cy="4608513"/>
+            <a:off x="929640" y="2249487"/>
+            <a:ext cx="6878199" cy="4608513"/>
           </a:xfrm>
         </p:spPr>
         <p:txBody>
           <a:bodyPr>
-            <a:normAutofit fontScale="92500" lnSpcReduction="20000"/>
+            <a:normAutofit fontScale="85000" lnSpcReduction="10000"/>
           </a:bodyPr>
           <a:lstStyle/>
           <a:p>
@@ -30403,8 +30410,11 @@
             </a:r>
             <a:r>
               <a:rPr lang="en-US" dirty="0"/>
-              <a:t> yelling at us (rightfully so)</a:t>
-            </a:r>
+              <a:t> yelling (rightfully so)</a:t>
+            </a:r>
+          </a:p>
+          <a:p>
+            <a:endParaRPr lang="en-US" dirty="0"/>
           </a:p>
           <a:p>
             <a:endParaRPr lang="en-US" dirty="0"/>
@@ -30489,7 +30499,7 @@
         </p:blipFill>
         <p:spPr>
           <a:xfrm>
-            <a:off x="7618169" y="2097088"/>
+            <a:off x="7807839" y="2301438"/>
             <a:ext cx="4384161" cy="1770857"/>
           </a:xfrm>
           <a:prstGeom prst="rect">
@@ -30519,7 +30529,7 @@
         </p:blipFill>
         <p:spPr>
           <a:xfrm>
-            <a:off x="7737548" y="4380548"/>
+            <a:off x="5487047" y="4124246"/>
             <a:ext cx="4384162" cy="393700"/>
           </a:xfrm>
           <a:prstGeom prst="rect">
@@ -30749,7 +30759,7 @@
                                         <p:tgtEl>
                                           <p:spTgt spid="3">
                                             <p:txEl>
-                                              <p:pRg st="3" end="3"/>
+                                              <p:pRg st="4" end="4"/>
                                             </p:txEl>
                                           </p:spTgt>
                                         </p:tgtEl>
@@ -30767,7 +30777,7 @@
                                         <p:tgtEl>
                                           <p:spTgt spid="3">
                                             <p:txEl>
-                                              <p:pRg st="3" end="3"/>
+                                              <p:pRg st="4" end="4"/>
                                             </p:txEl>
                                           </p:spTgt>
                                         </p:tgtEl>
@@ -30794,7 +30804,7 @@
                                         <p:tgtEl>
                                           <p:spTgt spid="3">
                                             <p:txEl>
-                                              <p:pRg st="3" end="3"/>
+                                              <p:pRg st="4" end="4"/>
                                             </p:txEl>
                                           </p:spTgt>
                                         </p:tgtEl>
@@ -30907,7 +30917,7 @@
                                         <p:tgtEl>
                                           <p:spTgt spid="3">
                                             <p:txEl>
-                                              <p:pRg st="4" end="4"/>
+                                              <p:pRg st="5" end="5"/>
                                             </p:txEl>
                                           </p:spTgt>
                                         </p:tgtEl>
@@ -30925,7 +30935,7 @@
                                         <p:tgtEl>
                                           <p:spTgt spid="3">
                                             <p:txEl>
-                                              <p:pRg st="4" end="4"/>
+                                              <p:pRg st="5" end="5"/>
                                             </p:txEl>
                                           </p:spTgt>
                                         </p:tgtEl>
@@ -30952,7 +30962,7 @@
                                         <p:tgtEl>
                                           <p:spTgt spid="3">
                                             <p:txEl>
-                                              <p:pRg st="4" end="4"/>
+                                              <p:pRg st="5" end="5"/>
                                             </p:txEl>
                                           </p:spTgt>
                                         </p:tgtEl>
@@ -31010,7 +31020,7 @@
                                         <p:tgtEl>
                                           <p:spTgt spid="3">
                                             <p:txEl>
-                                              <p:pRg st="6" end="6"/>
+                                              <p:pRg st="7" end="7"/>
                                             </p:txEl>
                                           </p:spTgt>
                                         </p:tgtEl>
@@ -31028,7 +31038,7 @@
                                         <p:tgtEl>
                                           <p:spTgt spid="3">
                                             <p:txEl>
-                                              <p:pRg st="6" end="6"/>
+                                              <p:pRg st="7" end="7"/>
                                             </p:txEl>
                                           </p:spTgt>
                                         </p:tgtEl>
@@ -31055,7 +31065,7 @@
                                         <p:tgtEl>
                                           <p:spTgt spid="3">
                                             <p:txEl>
-                                              <p:pRg st="6" end="6"/>
+                                              <p:pRg st="7" end="7"/>
                                             </p:txEl>
                                           </p:spTgt>
                                         </p:tgtEl>

</xml_diff>